<commit_message>
tree of life power point fig added
</commit_message>
<xml_diff>
--- a/investigation/docs/tree_of_life.pptx
+++ b/investigation/docs/tree_of_life.pptx
@@ -3103,7 +3103,7 @@
         </p:nvSpPr>
         <p:spPr>
           <a:xfrm>
-            <a:off x="3916676" y="504759"/>
+            <a:off x="3916676" y="36823"/>
             <a:ext cx="1310647" cy="732714"/>
           </a:xfrm>
           <a:prstGeom prst="roundRect">
@@ -3153,7 +3153,7 @@
         </p:nvCxnSpPr>
         <p:spPr>
           <a:xfrm flipH="1">
-            <a:off x="2515465" y="1343309"/>
+            <a:off x="2515465" y="875373"/>
             <a:ext cx="2010744" cy="635019"/>
           </a:xfrm>
           <a:prstGeom prst="straightConnector1">
@@ -3186,7 +3186,7 @@
         </p:nvCxnSpPr>
         <p:spPr>
           <a:xfrm>
-            <a:off x="4672741" y="1343309"/>
+            <a:off x="4672741" y="875373"/>
             <a:ext cx="2059588" cy="635019"/>
           </a:xfrm>
           <a:prstGeom prst="straightConnector1">
@@ -3219,7 +3219,7 @@
         </p:nvSpPr>
         <p:spPr>
           <a:xfrm>
-            <a:off x="1799077" y="2059740"/>
+            <a:off x="1440873" y="1591804"/>
             <a:ext cx="1530445" cy="545465"/>
           </a:xfrm>
           <a:prstGeom prst="roundRect">
@@ -3269,7 +3269,7 @@
         </p:nvSpPr>
         <p:spPr>
           <a:xfrm>
-            <a:off x="6038090" y="2059740"/>
+            <a:off x="6038090" y="1591804"/>
             <a:ext cx="1530445" cy="545465"/>
           </a:xfrm>
           <a:prstGeom prst="roundRect">
@@ -3302,6 +3302,472 @@
                 </a:solidFill>
               </a:rPr>
               <a:t>Filter 2 (n=95)</a:t>
+            </a:r>
+            <a:endParaRPr lang="en-US" sz="1400" dirty="0">
+              <a:solidFill>
+                <a:srgbClr val="000000"/>
+              </a:solidFill>
+            </a:endParaRPr>
+          </a:p>
+        </p:txBody>
+      </p:sp>
+      <p:sp>
+        <p:nvSpPr>
+          <p:cNvPr id="11" name="Rounded Rectangle 10"/>
+          <p:cNvSpPr/>
+          <p:nvPr/>
+        </p:nvSpPr>
+        <p:spPr>
+          <a:xfrm>
+            <a:off x="293056" y="2332660"/>
+            <a:ext cx="887341" cy="628403"/>
+          </a:xfrm>
+          <a:prstGeom prst="roundRect">
+            <a:avLst/>
+          </a:prstGeom>
+        </p:spPr>
+        <p:style>
+          <a:lnRef idx="1">
+            <a:schemeClr val="accent1"/>
+          </a:lnRef>
+          <a:fillRef idx="3">
+            <a:schemeClr val="accent1"/>
+          </a:fillRef>
+          <a:effectRef idx="2">
+            <a:schemeClr val="accent1"/>
+          </a:effectRef>
+          <a:fontRef idx="minor">
+            <a:schemeClr val="lt1"/>
+          </a:fontRef>
+        </p:style>
+        <p:txBody>
+          <a:bodyPr rtlCol="0" anchor="ctr"/>
+          <a:lstStyle/>
+          <a:p>
+            <a:pPr algn="ctr"/>
+            <a:r>
+              <a:rPr lang="en-US" sz="1400" dirty="0" smtClean="0">
+                <a:solidFill>
+                  <a:srgbClr val="000000"/>
+                </a:solidFill>
+              </a:rPr>
+              <a:t>Cis-cis* (n=27)</a:t>
+            </a:r>
+            <a:endParaRPr lang="en-US" sz="1400" dirty="0">
+              <a:solidFill>
+                <a:srgbClr val="000000"/>
+              </a:solidFill>
+            </a:endParaRPr>
+          </a:p>
+        </p:txBody>
+      </p:sp>
+      <p:sp>
+        <p:nvSpPr>
+          <p:cNvPr id="12" name="Rounded Rectangle 11"/>
+          <p:cNvSpPr/>
+          <p:nvPr/>
+        </p:nvSpPr>
+        <p:spPr>
+          <a:xfrm>
+            <a:off x="1465303" y="2332661"/>
+            <a:ext cx="993177" cy="628403"/>
+          </a:xfrm>
+          <a:prstGeom prst="roundRect">
+            <a:avLst/>
+          </a:prstGeom>
+        </p:spPr>
+        <p:style>
+          <a:lnRef idx="1">
+            <a:schemeClr val="accent1"/>
+          </a:lnRef>
+          <a:fillRef idx="3">
+            <a:schemeClr val="accent1"/>
+          </a:fillRef>
+          <a:effectRef idx="2">
+            <a:schemeClr val="accent1"/>
+          </a:effectRef>
+          <a:fontRef idx="minor">
+            <a:schemeClr val="lt1"/>
+          </a:fontRef>
+        </p:style>
+        <p:txBody>
+          <a:bodyPr rtlCol="0" anchor="ctr"/>
+          <a:lstStyle/>
+          <a:p>
+            <a:pPr algn="ctr"/>
+            <a:r>
+              <a:rPr lang="en-US" sz="1400" dirty="0" smtClean="0">
+                <a:solidFill>
+                  <a:srgbClr val="000000"/>
+                </a:solidFill>
+              </a:rPr>
+              <a:t>Cis-trans (n=368)</a:t>
+            </a:r>
+            <a:endParaRPr lang="en-US" sz="1400" dirty="0">
+              <a:solidFill>
+                <a:srgbClr val="000000"/>
+              </a:solidFill>
+            </a:endParaRPr>
+          </a:p>
+        </p:txBody>
+      </p:sp>
+      <p:sp>
+        <p:nvSpPr>
+          <p:cNvPr id="13" name="Rounded Rectangle 12"/>
+          <p:cNvSpPr/>
+          <p:nvPr/>
+        </p:nvSpPr>
+        <p:spPr>
+          <a:xfrm>
+            <a:off x="2686391" y="2332661"/>
+            <a:ext cx="969773" cy="628403"/>
+          </a:xfrm>
+          <a:prstGeom prst="roundRect">
+            <a:avLst/>
+          </a:prstGeom>
+        </p:spPr>
+        <p:style>
+          <a:lnRef idx="1">
+            <a:schemeClr val="accent1"/>
+          </a:lnRef>
+          <a:fillRef idx="3">
+            <a:schemeClr val="accent1"/>
+          </a:fillRef>
+          <a:effectRef idx="2">
+            <a:schemeClr val="accent1"/>
+          </a:effectRef>
+          <a:fontRef idx="minor">
+            <a:schemeClr val="lt1"/>
+          </a:fontRef>
+        </p:style>
+        <p:txBody>
+          <a:bodyPr rtlCol="0" anchor="ctr"/>
+          <a:lstStyle/>
+          <a:p>
+            <a:pPr algn="ctr"/>
+            <a:r>
+              <a:rPr lang="en-US" sz="1200" dirty="0" smtClean="0">
+                <a:solidFill>
+                  <a:srgbClr val="000000"/>
+                </a:solidFill>
+              </a:rPr>
+              <a:t>Trans-trans (n=11)</a:t>
+            </a:r>
+            <a:endParaRPr lang="en-US" sz="1200" dirty="0">
+              <a:solidFill>
+                <a:srgbClr val="000000"/>
+              </a:solidFill>
+            </a:endParaRPr>
+          </a:p>
+        </p:txBody>
+      </p:sp>
+      <p:sp>
+        <p:nvSpPr>
+          <p:cNvPr id="17" name="Rounded Rectangle 16"/>
+          <p:cNvSpPr/>
+          <p:nvPr/>
+        </p:nvSpPr>
+        <p:spPr>
+          <a:xfrm>
+            <a:off x="5227323" y="2330397"/>
+            <a:ext cx="887341" cy="628403"/>
+          </a:xfrm>
+          <a:prstGeom prst="roundRect">
+            <a:avLst/>
+          </a:prstGeom>
+        </p:spPr>
+        <p:style>
+          <a:lnRef idx="1">
+            <a:schemeClr val="accent1"/>
+          </a:lnRef>
+          <a:fillRef idx="3">
+            <a:schemeClr val="accent1"/>
+          </a:fillRef>
+          <a:effectRef idx="2">
+            <a:schemeClr val="accent1"/>
+          </a:effectRef>
+          <a:fontRef idx="minor">
+            <a:schemeClr val="lt1"/>
+          </a:fontRef>
+        </p:style>
+        <p:txBody>
+          <a:bodyPr rtlCol="0" anchor="ctr"/>
+          <a:lstStyle/>
+          <a:p>
+            <a:pPr algn="ctr"/>
+            <a:r>
+              <a:rPr lang="en-US" sz="1400" dirty="0" smtClean="0">
+                <a:solidFill>
+                  <a:srgbClr val="000000"/>
+                </a:solidFill>
+              </a:rPr>
+              <a:t>Cis-cis* (n=21)</a:t>
+            </a:r>
+            <a:endParaRPr lang="en-US" sz="1400" dirty="0">
+              <a:solidFill>
+                <a:srgbClr val="000000"/>
+              </a:solidFill>
+            </a:endParaRPr>
+          </a:p>
+        </p:txBody>
+      </p:sp>
+      <p:sp>
+        <p:nvSpPr>
+          <p:cNvPr id="18" name="Rounded Rectangle 17"/>
+          <p:cNvSpPr/>
+          <p:nvPr/>
+        </p:nvSpPr>
+        <p:spPr>
+          <a:xfrm>
+            <a:off x="6399570" y="2330398"/>
+            <a:ext cx="993177" cy="628403"/>
+          </a:xfrm>
+          <a:prstGeom prst="roundRect">
+            <a:avLst/>
+          </a:prstGeom>
+        </p:spPr>
+        <p:style>
+          <a:lnRef idx="1">
+            <a:schemeClr val="accent1"/>
+          </a:lnRef>
+          <a:fillRef idx="3">
+            <a:schemeClr val="accent1"/>
+          </a:fillRef>
+          <a:effectRef idx="2">
+            <a:schemeClr val="accent1"/>
+          </a:effectRef>
+          <a:fontRef idx="minor">
+            <a:schemeClr val="lt1"/>
+          </a:fontRef>
+        </p:style>
+        <p:txBody>
+          <a:bodyPr rtlCol="0" anchor="ctr"/>
+          <a:lstStyle/>
+          <a:p>
+            <a:pPr algn="ctr"/>
+            <a:r>
+              <a:rPr lang="en-US" sz="1400" dirty="0" smtClean="0">
+                <a:solidFill>
+                  <a:srgbClr val="000000"/>
+                </a:solidFill>
+              </a:rPr>
+              <a:t>Cis-trans (n=72)</a:t>
+            </a:r>
+            <a:endParaRPr lang="en-US" sz="1400" dirty="0">
+              <a:solidFill>
+                <a:srgbClr val="000000"/>
+              </a:solidFill>
+            </a:endParaRPr>
+          </a:p>
+        </p:txBody>
+      </p:sp>
+      <p:sp>
+        <p:nvSpPr>
+          <p:cNvPr id="19" name="Rounded Rectangle 18"/>
+          <p:cNvSpPr/>
+          <p:nvPr/>
+        </p:nvSpPr>
+        <p:spPr>
+          <a:xfrm>
+            <a:off x="7620658" y="2330398"/>
+            <a:ext cx="969773" cy="628403"/>
+          </a:xfrm>
+          <a:prstGeom prst="roundRect">
+            <a:avLst/>
+          </a:prstGeom>
+        </p:spPr>
+        <p:style>
+          <a:lnRef idx="1">
+            <a:schemeClr val="accent1"/>
+          </a:lnRef>
+          <a:fillRef idx="3">
+            <a:schemeClr val="accent1"/>
+          </a:fillRef>
+          <a:effectRef idx="2">
+            <a:schemeClr val="accent1"/>
+          </a:effectRef>
+          <a:fontRef idx="minor">
+            <a:schemeClr val="lt1"/>
+          </a:fontRef>
+        </p:style>
+        <p:txBody>
+          <a:bodyPr rtlCol="0" anchor="ctr"/>
+          <a:lstStyle/>
+          <a:p>
+            <a:pPr algn="ctr"/>
+            <a:r>
+              <a:rPr lang="en-US" sz="1200" dirty="0" smtClean="0">
+                <a:solidFill>
+                  <a:srgbClr val="000000"/>
+                </a:solidFill>
+              </a:rPr>
+              <a:t>Trans-trans (n=2)</a:t>
+            </a:r>
+            <a:endParaRPr lang="en-US" sz="1200" dirty="0">
+              <a:solidFill>
+                <a:srgbClr val="000000"/>
+              </a:solidFill>
+            </a:endParaRPr>
+          </a:p>
+        </p:txBody>
+      </p:sp>
+      <p:sp>
+        <p:nvSpPr>
+          <p:cNvPr id="20" name="Rounded Rectangle 19"/>
+          <p:cNvSpPr/>
+          <p:nvPr/>
+        </p:nvSpPr>
+        <p:spPr>
+          <a:xfrm>
+            <a:off x="3718177" y="3317229"/>
+            <a:ext cx="1345228" cy="869000"/>
+          </a:xfrm>
+          <a:prstGeom prst="roundRect">
+            <a:avLst/>
+          </a:prstGeom>
+        </p:spPr>
+        <p:style>
+          <a:lnRef idx="1">
+            <a:schemeClr val="accent1"/>
+          </a:lnRef>
+          <a:fillRef idx="3">
+            <a:schemeClr val="accent1"/>
+          </a:fillRef>
+          <a:effectRef idx="2">
+            <a:schemeClr val="accent1"/>
+          </a:effectRef>
+          <a:fontRef idx="minor">
+            <a:schemeClr val="lt1"/>
+          </a:fontRef>
+        </p:style>
+        <p:txBody>
+          <a:bodyPr rtlCol="0" anchor="ctr"/>
+          <a:lstStyle/>
+          <a:p>
+            <a:pPr algn="ctr"/>
+            <a:r>
+              <a:rPr lang="en-US" sz="1400" dirty="0" smtClean="0">
+                <a:solidFill>
+                  <a:srgbClr val="000000"/>
+                </a:solidFill>
+              </a:rPr>
+              <a:t>Permutation p &lt; 4.4e-6</a:t>
+            </a:r>
+            <a:endParaRPr lang="en-US" sz="1400" dirty="0">
+              <a:solidFill>
+                <a:srgbClr val="000000"/>
+              </a:solidFill>
+            </a:endParaRPr>
+          </a:p>
+        </p:txBody>
+      </p:sp>
+      <p:sp>
+        <p:nvSpPr>
+          <p:cNvPr id="21" name="Rounded Rectangle 20"/>
+          <p:cNvSpPr/>
+          <p:nvPr/>
+        </p:nvSpPr>
+        <p:spPr>
+          <a:xfrm>
+            <a:off x="3718177" y="4338629"/>
+            <a:ext cx="1345228" cy="869000"/>
+          </a:xfrm>
+          <a:prstGeom prst="roundRect">
+            <a:avLst/>
+          </a:prstGeom>
+        </p:spPr>
+        <p:style>
+          <a:lnRef idx="1">
+            <a:schemeClr val="accent1"/>
+          </a:lnRef>
+          <a:fillRef idx="3">
+            <a:schemeClr val="accent1"/>
+          </a:fillRef>
+          <a:effectRef idx="2">
+            <a:schemeClr val="accent1"/>
+          </a:effectRef>
+          <a:fontRef idx="minor">
+            <a:schemeClr val="lt1"/>
+          </a:fontRef>
+        </p:style>
+        <p:txBody>
+          <a:bodyPr rtlCol="0" anchor="ctr"/>
+          <a:lstStyle/>
+          <a:p>
+            <a:pPr algn="ctr"/>
+            <a:r>
+              <a:rPr lang="en-US" sz="1400" dirty="0" smtClean="0">
+                <a:solidFill>
+                  <a:srgbClr val="000000"/>
+                </a:solidFill>
+              </a:rPr>
+              <a:t>GWAS GC Lambda F correction p &lt; 4.48e-6</a:t>
+            </a:r>
+            <a:endParaRPr lang="en-US" sz="1400" dirty="0">
+              <a:solidFill>
+                <a:srgbClr val="000000"/>
+              </a:solidFill>
+            </a:endParaRPr>
+          </a:p>
+        </p:txBody>
+      </p:sp>
+      <p:sp>
+        <p:nvSpPr>
+          <p:cNvPr id="22" name="Rounded Rectangle 21"/>
+          <p:cNvSpPr/>
+          <p:nvPr/>
+        </p:nvSpPr>
+        <p:spPr>
+          <a:xfrm>
+            <a:off x="3718177" y="5401806"/>
+            <a:ext cx="1345228" cy="869000"/>
+          </a:xfrm>
+          <a:prstGeom prst="roundRect">
+            <a:avLst/>
+          </a:prstGeom>
+        </p:spPr>
+        <p:style>
+          <a:lnRef idx="1">
+            <a:schemeClr val="accent1"/>
+          </a:lnRef>
+          <a:fillRef idx="3">
+            <a:schemeClr val="accent1"/>
+          </a:fillRef>
+          <a:effectRef idx="2">
+            <a:schemeClr val="accent1"/>
+          </a:effectRef>
+          <a:fontRef idx="minor">
+            <a:schemeClr val="lt1"/>
+          </a:fontRef>
+        </p:style>
+        <p:txBody>
+          <a:bodyPr rtlCol="0" anchor="ctr"/>
+          <a:lstStyle/>
+          <a:p>
+            <a:pPr algn="ctr"/>
+            <a:r>
+              <a:rPr lang="en-US" sz="1400" dirty="0" smtClean="0">
+                <a:solidFill>
+                  <a:srgbClr val="000000"/>
+                </a:solidFill>
+              </a:rPr>
+              <a:t>GWAS GC Lambda </a:t>
+            </a:r>
+            <a:r>
+              <a:rPr lang="en-US" sz="1400" dirty="0" err="1" smtClean="0">
+                <a:solidFill>
+                  <a:srgbClr val="000000"/>
+                </a:solidFill>
+              </a:rPr>
+              <a:t>Chisq</a:t>
+            </a:r>
+            <a:r>
+              <a:rPr lang="en-US" sz="1400" dirty="0" smtClean="0">
+                <a:solidFill>
+                  <a:srgbClr val="000000"/>
+                </a:solidFill>
+              </a:rPr>
+              <a:t> correction p &lt; 4.48e-6</a:t>
             </a:r>
             <a:endParaRPr lang="en-US" sz="1400" dirty="0">
               <a:solidFill>

</xml_diff>

<commit_message>
edits to analysis scripts and figs added
</commit_message>
<xml_diff>
--- a/investigation/docs/tree_of_life.pptx
+++ b/investigation/docs/tree_of_life.pptx
@@ -3095,688 +3095,1729 @@
           <a:chExt cx="0" cy="0"/>
         </a:xfrm>
       </p:grpSpPr>
-      <p:sp>
-        <p:nvSpPr>
-          <p:cNvPr id="4" name="Rounded Rectangle 3"/>
-          <p:cNvSpPr/>
+      <p:grpSp>
+        <p:nvGrpSpPr>
+          <p:cNvPr id="41" name="Group 40"/>
+          <p:cNvGrpSpPr/>
           <p:nvPr/>
-        </p:nvSpPr>
-        <p:spPr>
+        </p:nvGrpSpPr>
+        <p:grpSpPr>
           <a:xfrm>
-            <a:off x="3916676" y="36823"/>
-            <a:ext cx="1310647" cy="732714"/>
+            <a:off x="293056" y="36823"/>
+            <a:ext cx="8297375" cy="6233983"/>
+            <a:chOff x="293056" y="36823"/>
+            <a:chExt cx="8297375" cy="6233983"/>
           </a:xfrm>
-          <a:prstGeom prst="roundRect">
-            <a:avLst/>
-          </a:prstGeom>
-        </p:spPr>
-        <p:style>
-          <a:lnRef idx="1">
-            <a:schemeClr val="accent1"/>
-          </a:lnRef>
-          <a:fillRef idx="3">
-            <a:schemeClr val="accent1"/>
-          </a:fillRef>
-          <a:effectRef idx="2">
-            <a:schemeClr val="accent1"/>
-          </a:effectRef>
-          <a:fontRef idx="minor">
-            <a:schemeClr val="lt1"/>
-          </a:fontRef>
-        </p:style>
-        <p:txBody>
-          <a:bodyPr rtlCol="0" anchor="ctr"/>
-          <a:lstStyle/>
-          <a:p>
-            <a:pPr algn="ctr"/>
-            <a:r>
-              <a:rPr lang="en-US" sz="1600" dirty="0" smtClean="0">
+        </p:grpSpPr>
+        <p:sp>
+          <p:nvSpPr>
+            <p:cNvPr id="4" name="Rounded Rectangle 3"/>
+            <p:cNvSpPr/>
+            <p:nvPr/>
+          </p:nvSpPr>
+          <p:spPr>
+            <a:xfrm>
+              <a:off x="3916676" y="36823"/>
+              <a:ext cx="1310647" cy="732714"/>
+            </a:xfrm>
+            <a:prstGeom prst="roundRect">
+              <a:avLst/>
+            </a:prstGeom>
+          </p:spPr>
+          <p:style>
+            <a:lnRef idx="1">
+              <a:schemeClr val="accent1"/>
+            </a:lnRef>
+            <a:fillRef idx="3">
+              <a:schemeClr val="accent1"/>
+            </a:fillRef>
+            <a:effectRef idx="2">
+              <a:schemeClr val="accent1"/>
+            </a:effectRef>
+            <a:fontRef idx="minor">
+              <a:schemeClr val="lt1"/>
+            </a:fontRef>
+          </p:style>
+          <p:txBody>
+            <a:bodyPr rtlCol="0" anchor="ctr"/>
+            <a:lstStyle/>
+            <a:p>
+              <a:pPr algn="ctr"/>
+              <a:r>
+                <a:rPr lang="en-US" sz="1600" dirty="0" smtClean="0">
+                  <a:solidFill>
+                    <a:schemeClr val="tx1"/>
+                  </a:solidFill>
+                </a:rPr>
+                <a:t>501 original pairs</a:t>
+              </a:r>
+              <a:endParaRPr lang="en-US" sz="1600" dirty="0">
                 <a:solidFill>
                   <a:schemeClr val="tx1"/>
                 </a:solidFill>
-              </a:rPr>
-              <a:t>501 original pairs</a:t>
-            </a:r>
-            <a:endParaRPr lang="en-US" sz="1600" dirty="0">
-              <a:solidFill>
-                <a:schemeClr val="tx1"/>
-              </a:solidFill>
-            </a:endParaRPr>
-          </a:p>
-        </p:txBody>
-      </p:sp>
-      <p:cxnSp>
-        <p:nvCxnSpPr>
-          <p:cNvPr id="6" name="Straight Arrow Connector 5"/>
-          <p:cNvCxnSpPr/>
-          <p:nvPr/>
-        </p:nvCxnSpPr>
-        <p:spPr>
-          <a:xfrm flipH="1">
-            <a:off x="2515465" y="875373"/>
-            <a:ext cx="2010744" cy="635019"/>
-          </a:xfrm>
-          <a:prstGeom prst="straightConnector1">
-            <a:avLst/>
-          </a:prstGeom>
-          <a:ln>
-            <a:tailEnd type="arrow"/>
-          </a:ln>
-        </p:spPr>
-        <p:style>
-          <a:lnRef idx="2">
-            <a:schemeClr val="accent1"/>
-          </a:lnRef>
-          <a:fillRef idx="0">
-            <a:schemeClr val="accent1"/>
-          </a:fillRef>
-          <a:effectRef idx="1">
-            <a:schemeClr val="accent1"/>
-          </a:effectRef>
-          <a:fontRef idx="minor">
-            <a:schemeClr val="tx1"/>
-          </a:fontRef>
-        </p:style>
-      </p:cxnSp>
-      <p:cxnSp>
-        <p:nvCxnSpPr>
-          <p:cNvPr id="8" name="Straight Arrow Connector 7"/>
-          <p:cNvCxnSpPr/>
-          <p:nvPr/>
-        </p:nvCxnSpPr>
-        <p:spPr>
-          <a:xfrm>
-            <a:off x="4672741" y="875373"/>
-            <a:ext cx="2059588" cy="635019"/>
-          </a:xfrm>
-          <a:prstGeom prst="straightConnector1">
-            <a:avLst/>
-          </a:prstGeom>
-          <a:ln>
-            <a:tailEnd type="arrow"/>
-          </a:ln>
-        </p:spPr>
-        <p:style>
-          <a:lnRef idx="2">
-            <a:schemeClr val="accent1"/>
-          </a:lnRef>
-          <a:fillRef idx="0">
-            <a:schemeClr val="accent1"/>
-          </a:fillRef>
-          <a:effectRef idx="1">
-            <a:schemeClr val="accent1"/>
-          </a:effectRef>
-          <a:fontRef idx="minor">
-            <a:schemeClr val="tx1"/>
-          </a:fontRef>
-        </p:style>
-      </p:cxnSp>
-      <p:sp>
-        <p:nvSpPr>
-          <p:cNvPr id="9" name="Rounded Rectangle 8"/>
-          <p:cNvSpPr/>
-          <p:nvPr/>
-        </p:nvSpPr>
-        <p:spPr>
-          <a:xfrm>
-            <a:off x="1440873" y="1591804"/>
-            <a:ext cx="1530445" cy="545465"/>
-          </a:xfrm>
-          <a:prstGeom prst="roundRect">
-            <a:avLst/>
-          </a:prstGeom>
-        </p:spPr>
-        <p:style>
-          <a:lnRef idx="1">
-            <a:schemeClr val="accent1"/>
-          </a:lnRef>
-          <a:fillRef idx="3">
-            <a:schemeClr val="accent1"/>
-          </a:fillRef>
-          <a:effectRef idx="2">
-            <a:schemeClr val="accent1"/>
-          </a:effectRef>
-          <a:fontRef idx="minor">
-            <a:schemeClr val="lt1"/>
-          </a:fontRef>
-        </p:style>
-        <p:txBody>
-          <a:bodyPr rtlCol="0" anchor="ctr"/>
-          <a:lstStyle/>
-          <a:p>
-            <a:pPr algn="ctr"/>
-            <a:r>
-              <a:rPr lang="en-US" sz="1400" dirty="0" smtClean="0">
+              </a:endParaRPr>
+            </a:p>
+          </p:txBody>
+        </p:sp>
+        <p:cxnSp>
+          <p:nvCxnSpPr>
+            <p:cNvPr id="6" name="Straight Arrow Connector 5"/>
+            <p:cNvCxnSpPr/>
+            <p:nvPr/>
+          </p:nvCxnSpPr>
+          <p:spPr>
+            <a:xfrm flipH="1">
+              <a:off x="2515465" y="875373"/>
+              <a:ext cx="2010744" cy="635019"/>
+            </a:xfrm>
+            <a:prstGeom prst="straightConnector1">
+              <a:avLst/>
+            </a:prstGeom>
+            <a:ln>
+              <a:tailEnd type="arrow"/>
+            </a:ln>
+          </p:spPr>
+          <p:style>
+            <a:lnRef idx="2">
+              <a:schemeClr val="accent1"/>
+            </a:lnRef>
+            <a:fillRef idx="0">
+              <a:schemeClr val="accent1"/>
+            </a:fillRef>
+            <a:effectRef idx="1">
+              <a:schemeClr val="accent1"/>
+            </a:effectRef>
+            <a:fontRef idx="minor">
+              <a:schemeClr val="tx1"/>
+            </a:fontRef>
+          </p:style>
+        </p:cxnSp>
+        <p:cxnSp>
+          <p:nvCxnSpPr>
+            <p:cNvPr id="8" name="Straight Arrow Connector 7"/>
+            <p:cNvCxnSpPr/>
+            <p:nvPr/>
+          </p:nvCxnSpPr>
+          <p:spPr>
+            <a:xfrm>
+              <a:off x="4672741" y="875373"/>
+              <a:ext cx="2059588" cy="635019"/>
+            </a:xfrm>
+            <a:prstGeom prst="straightConnector1">
+              <a:avLst/>
+            </a:prstGeom>
+            <a:ln>
+              <a:tailEnd type="arrow"/>
+            </a:ln>
+          </p:spPr>
+          <p:style>
+            <a:lnRef idx="2">
+              <a:schemeClr val="accent1"/>
+            </a:lnRef>
+            <a:fillRef idx="0">
+              <a:schemeClr val="accent1"/>
+            </a:fillRef>
+            <a:effectRef idx="1">
+              <a:schemeClr val="accent1"/>
+            </a:effectRef>
+            <a:fontRef idx="minor">
+              <a:schemeClr val="tx1"/>
+            </a:fontRef>
+          </p:style>
+        </p:cxnSp>
+        <p:sp>
+          <p:nvSpPr>
+            <p:cNvPr id="9" name="Rounded Rectangle 8"/>
+            <p:cNvSpPr/>
+            <p:nvPr/>
+          </p:nvSpPr>
+          <p:spPr>
+            <a:xfrm>
+              <a:off x="1440873" y="1591804"/>
+              <a:ext cx="1530445" cy="545465"/>
+            </a:xfrm>
+            <a:prstGeom prst="roundRect">
+              <a:avLst/>
+            </a:prstGeom>
+          </p:spPr>
+          <p:style>
+            <a:lnRef idx="1">
+              <a:schemeClr val="accent1"/>
+            </a:lnRef>
+            <a:fillRef idx="3">
+              <a:schemeClr val="accent1"/>
+            </a:fillRef>
+            <a:effectRef idx="2">
+              <a:schemeClr val="accent1"/>
+            </a:effectRef>
+            <a:fontRef idx="minor">
+              <a:schemeClr val="lt1"/>
+            </a:fontRef>
+          </p:style>
+          <p:txBody>
+            <a:bodyPr rtlCol="0" anchor="ctr"/>
+            <a:lstStyle/>
+            <a:p>
+              <a:pPr algn="ctr"/>
+              <a:r>
+                <a:rPr lang="en-US" sz="1400" dirty="0" smtClean="0">
+                  <a:solidFill>
+                    <a:srgbClr val="000000"/>
+                  </a:solidFill>
+                </a:rPr>
+                <a:t>Filter 1 (n=406)</a:t>
+              </a:r>
+              <a:endParaRPr lang="en-US" sz="1400" dirty="0">
                 <a:solidFill>
                   <a:srgbClr val="000000"/>
                 </a:solidFill>
-              </a:rPr>
-              <a:t>Filter 1 (n=406)</a:t>
-            </a:r>
-            <a:endParaRPr lang="en-US" sz="1400" dirty="0">
-              <a:solidFill>
-                <a:srgbClr val="000000"/>
-              </a:solidFill>
-            </a:endParaRPr>
-          </a:p>
-        </p:txBody>
-      </p:sp>
-      <p:sp>
-        <p:nvSpPr>
-          <p:cNvPr id="10" name="Rounded Rectangle 9"/>
-          <p:cNvSpPr/>
-          <p:nvPr/>
-        </p:nvSpPr>
-        <p:spPr>
-          <a:xfrm>
-            <a:off x="6038090" y="1591804"/>
-            <a:ext cx="1530445" cy="545465"/>
-          </a:xfrm>
-          <a:prstGeom prst="roundRect">
-            <a:avLst/>
-          </a:prstGeom>
-        </p:spPr>
-        <p:style>
-          <a:lnRef idx="1">
-            <a:schemeClr val="accent1"/>
-          </a:lnRef>
-          <a:fillRef idx="3">
-            <a:schemeClr val="accent1"/>
-          </a:fillRef>
-          <a:effectRef idx="2">
-            <a:schemeClr val="accent1"/>
-          </a:effectRef>
-          <a:fontRef idx="minor">
-            <a:schemeClr val="lt1"/>
-          </a:fontRef>
-        </p:style>
-        <p:txBody>
-          <a:bodyPr rtlCol="0" anchor="ctr"/>
-          <a:lstStyle/>
-          <a:p>
-            <a:pPr algn="ctr"/>
-            <a:r>
-              <a:rPr lang="en-US" sz="1400" dirty="0" smtClean="0">
+              </a:endParaRPr>
+            </a:p>
+          </p:txBody>
+        </p:sp>
+        <p:sp>
+          <p:nvSpPr>
+            <p:cNvPr id="10" name="Rounded Rectangle 9"/>
+            <p:cNvSpPr/>
+            <p:nvPr/>
+          </p:nvSpPr>
+          <p:spPr>
+            <a:xfrm>
+              <a:off x="6038090" y="1591804"/>
+              <a:ext cx="1530445" cy="545465"/>
+            </a:xfrm>
+            <a:prstGeom prst="roundRect">
+              <a:avLst/>
+            </a:prstGeom>
+          </p:spPr>
+          <p:style>
+            <a:lnRef idx="1">
+              <a:schemeClr val="accent1"/>
+            </a:lnRef>
+            <a:fillRef idx="3">
+              <a:schemeClr val="accent1"/>
+            </a:fillRef>
+            <a:effectRef idx="2">
+              <a:schemeClr val="accent1"/>
+            </a:effectRef>
+            <a:fontRef idx="minor">
+              <a:schemeClr val="lt1"/>
+            </a:fontRef>
+          </p:style>
+          <p:txBody>
+            <a:bodyPr rtlCol="0" anchor="ctr"/>
+            <a:lstStyle/>
+            <a:p>
+              <a:pPr algn="ctr"/>
+              <a:r>
+                <a:rPr lang="en-US" sz="1400" dirty="0" smtClean="0">
+                  <a:solidFill>
+                    <a:srgbClr val="000000"/>
+                  </a:solidFill>
+                </a:rPr>
+                <a:t>Filter 2 (n=95)</a:t>
+              </a:r>
+              <a:endParaRPr lang="en-US" sz="1400" dirty="0">
                 <a:solidFill>
                   <a:srgbClr val="000000"/>
                 </a:solidFill>
-              </a:rPr>
-              <a:t>Filter 2 (n=95)</a:t>
-            </a:r>
-            <a:endParaRPr lang="en-US" sz="1400" dirty="0">
-              <a:solidFill>
-                <a:srgbClr val="000000"/>
-              </a:solidFill>
-            </a:endParaRPr>
-          </a:p>
-        </p:txBody>
-      </p:sp>
-      <p:sp>
-        <p:nvSpPr>
-          <p:cNvPr id="11" name="Rounded Rectangle 10"/>
-          <p:cNvSpPr/>
-          <p:nvPr/>
-        </p:nvSpPr>
-        <p:spPr>
-          <a:xfrm>
-            <a:off x="293056" y="2332660"/>
-            <a:ext cx="887341" cy="628403"/>
-          </a:xfrm>
-          <a:prstGeom prst="roundRect">
-            <a:avLst/>
-          </a:prstGeom>
-        </p:spPr>
-        <p:style>
-          <a:lnRef idx="1">
-            <a:schemeClr val="accent1"/>
-          </a:lnRef>
-          <a:fillRef idx="3">
-            <a:schemeClr val="accent1"/>
-          </a:fillRef>
-          <a:effectRef idx="2">
-            <a:schemeClr val="accent1"/>
-          </a:effectRef>
-          <a:fontRef idx="minor">
-            <a:schemeClr val="lt1"/>
-          </a:fontRef>
-        </p:style>
-        <p:txBody>
-          <a:bodyPr rtlCol="0" anchor="ctr"/>
-          <a:lstStyle/>
-          <a:p>
-            <a:pPr algn="ctr"/>
-            <a:r>
-              <a:rPr lang="en-US" sz="1400" dirty="0" smtClean="0">
+              </a:endParaRPr>
+            </a:p>
+          </p:txBody>
+        </p:sp>
+        <p:sp>
+          <p:nvSpPr>
+            <p:cNvPr id="11" name="Rounded Rectangle 10"/>
+            <p:cNvSpPr/>
+            <p:nvPr/>
+          </p:nvSpPr>
+          <p:spPr>
+            <a:xfrm>
+              <a:off x="293056" y="2332660"/>
+              <a:ext cx="887341" cy="628403"/>
+            </a:xfrm>
+            <a:prstGeom prst="roundRect">
+              <a:avLst/>
+            </a:prstGeom>
+          </p:spPr>
+          <p:style>
+            <a:lnRef idx="1">
+              <a:schemeClr val="accent1"/>
+            </a:lnRef>
+            <a:fillRef idx="3">
+              <a:schemeClr val="accent1"/>
+            </a:fillRef>
+            <a:effectRef idx="2">
+              <a:schemeClr val="accent1"/>
+            </a:effectRef>
+            <a:fontRef idx="minor">
+              <a:schemeClr val="lt1"/>
+            </a:fontRef>
+          </p:style>
+          <p:txBody>
+            <a:bodyPr rtlCol="0" anchor="ctr"/>
+            <a:lstStyle/>
+            <a:p>
+              <a:pPr algn="ctr"/>
+              <a:r>
+                <a:rPr lang="en-US" sz="1400" dirty="0" smtClean="0">
+                  <a:solidFill>
+                    <a:srgbClr val="000000"/>
+                  </a:solidFill>
+                </a:rPr>
+                <a:t>Cis-cis* (n=27)</a:t>
+              </a:r>
+              <a:endParaRPr lang="en-US" sz="1400" dirty="0">
                 <a:solidFill>
                   <a:srgbClr val="000000"/>
                 </a:solidFill>
-              </a:rPr>
-              <a:t>Cis-cis* (n=27)</a:t>
-            </a:r>
-            <a:endParaRPr lang="en-US" sz="1400" dirty="0">
-              <a:solidFill>
-                <a:srgbClr val="000000"/>
-              </a:solidFill>
-            </a:endParaRPr>
-          </a:p>
-        </p:txBody>
-      </p:sp>
-      <p:sp>
-        <p:nvSpPr>
-          <p:cNvPr id="12" name="Rounded Rectangle 11"/>
-          <p:cNvSpPr/>
-          <p:nvPr/>
-        </p:nvSpPr>
-        <p:spPr>
-          <a:xfrm>
-            <a:off x="1465303" y="2332661"/>
-            <a:ext cx="993177" cy="628403"/>
-          </a:xfrm>
-          <a:prstGeom prst="roundRect">
-            <a:avLst/>
-          </a:prstGeom>
-        </p:spPr>
-        <p:style>
-          <a:lnRef idx="1">
-            <a:schemeClr val="accent1"/>
-          </a:lnRef>
-          <a:fillRef idx="3">
-            <a:schemeClr val="accent1"/>
-          </a:fillRef>
-          <a:effectRef idx="2">
-            <a:schemeClr val="accent1"/>
-          </a:effectRef>
-          <a:fontRef idx="minor">
-            <a:schemeClr val="lt1"/>
-          </a:fontRef>
-        </p:style>
-        <p:txBody>
-          <a:bodyPr rtlCol="0" anchor="ctr"/>
-          <a:lstStyle/>
-          <a:p>
-            <a:pPr algn="ctr"/>
-            <a:r>
-              <a:rPr lang="en-US" sz="1400" dirty="0" smtClean="0">
+              </a:endParaRPr>
+            </a:p>
+          </p:txBody>
+        </p:sp>
+        <p:sp>
+          <p:nvSpPr>
+            <p:cNvPr id="12" name="Rounded Rectangle 11"/>
+            <p:cNvSpPr/>
+            <p:nvPr/>
+          </p:nvSpPr>
+          <p:spPr>
+            <a:xfrm>
+              <a:off x="1465303" y="2332661"/>
+              <a:ext cx="993177" cy="628403"/>
+            </a:xfrm>
+            <a:prstGeom prst="roundRect">
+              <a:avLst/>
+            </a:prstGeom>
+          </p:spPr>
+          <p:style>
+            <a:lnRef idx="1">
+              <a:schemeClr val="accent1"/>
+            </a:lnRef>
+            <a:fillRef idx="3">
+              <a:schemeClr val="accent1"/>
+            </a:fillRef>
+            <a:effectRef idx="2">
+              <a:schemeClr val="accent1"/>
+            </a:effectRef>
+            <a:fontRef idx="minor">
+              <a:schemeClr val="lt1"/>
+            </a:fontRef>
+          </p:style>
+          <p:txBody>
+            <a:bodyPr rtlCol="0" anchor="ctr"/>
+            <a:lstStyle/>
+            <a:p>
+              <a:pPr algn="ctr"/>
+              <a:r>
+                <a:rPr lang="en-US" sz="1400" dirty="0" smtClean="0">
+                  <a:solidFill>
+                    <a:srgbClr val="000000"/>
+                  </a:solidFill>
+                </a:rPr>
+                <a:t>Cis-trans (n=368)</a:t>
+              </a:r>
+              <a:endParaRPr lang="en-US" sz="1400" dirty="0">
                 <a:solidFill>
                   <a:srgbClr val="000000"/>
                 </a:solidFill>
-              </a:rPr>
-              <a:t>Cis-trans (n=368)</a:t>
-            </a:r>
-            <a:endParaRPr lang="en-US" sz="1400" dirty="0">
-              <a:solidFill>
-                <a:srgbClr val="000000"/>
-              </a:solidFill>
-            </a:endParaRPr>
-          </a:p>
-        </p:txBody>
-      </p:sp>
-      <p:sp>
-        <p:nvSpPr>
-          <p:cNvPr id="13" name="Rounded Rectangle 12"/>
-          <p:cNvSpPr/>
-          <p:nvPr/>
-        </p:nvSpPr>
-        <p:spPr>
-          <a:xfrm>
-            <a:off x="2686391" y="2332661"/>
-            <a:ext cx="969773" cy="628403"/>
-          </a:xfrm>
-          <a:prstGeom prst="roundRect">
-            <a:avLst/>
-          </a:prstGeom>
-        </p:spPr>
-        <p:style>
-          <a:lnRef idx="1">
-            <a:schemeClr val="accent1"/>
-          </a:lnRef>
-          <a:fillRef idx="3">
-            <a:schemeClr val="accent1"/>
-          </a:fillRef>
-          <a:effectRef idx="2">
-            <a:schemeClr val="accent1"/>
-          </a:effectRef>
-          <a:fontRef idx="minor">
-            <a:schemeClr val="lt1"/>
-          </a:fontRef>
-        </p:style>
-        <p:txBody>
-          <a:bodyPr rtlCol="0" anchor="ctr"/>
-          <a:lstStyle/>
-          <a:p>
-            <a:pPr algn="ctr"/>
-            <a:r>
-              <a:rPr lang="en-US" sz="1200" dirty="0" smtClean="0">
+              </a:endParaRPr>
+            </a:p>
+          </p:txBody>
+        </p:sp>
+        <p:sp>
+          <p:nvSpPr>
+            <p:cNvPr id="13" name="Rounded Rectangle 12"/>
+            <p:cNvSpPr/>
+            <p:nvPr/>
+          </p:nvSpPr>
+          <p:spPr>
+            <a:xfrm>
+              <a:off x="2686391" y="2332661"/>
+              <a:ext cx="969773" cy="628403"/>
+            </a:xfrm>
+            <a:prstGeom prst="roundRect">
+              <a:avLst/>
+            </a:prstGeom>
+          </p:spPr>
+          <p:style>
+            <a:lnRef idx="1">
+              <a:schemeClr val="accent1"/>
+            </a:lnRef>
+            <a:fillRef idx="3">
+              <a:schemeClr val="accent1"/>
+            </a:fillRef>
+            <a:effectRef idx="2">
+              <a:schemeClr val="accent1"/>
+            </a:effectRef>
+            <a:fontRef idx="minor">
+              <a:schemeClr val="lt1"/>
+            </a:fontRef>
+          </p:style>
+          <p:txBody>
+            <a:bodyPr rtlCol="0" anchor="ctr"/>
+            <a:lstStyle/>
+            <a:p>
+              <a:pPr algn="ctr"/>
+              <a:r>
+                <a:rPr lang="en-US" sz="1200" dirty="0" smtClean="0">
+                  <a:solidFill>
+                    <a:srgbClr val="000000"/>
+                  </a:solidFill>
+                </a:rPr>
+                <a:t>Trans-trans (n=11)</a:t>
+              </a:r>
+              <a:endParaRPr lang="en-US" sz="1200" dirty="0">
                 <a:solidFill>
                   <a:srgbClr val="000000"/>
                 </a:solidFill>
-              </a:rPr>
-              <a:t>Trans-trans (n=11)</a:t>
-            </a:r>
-            <a:endParaRPr lang="en-US" sz="1200" dirty="0">
-              <a:solidFill>
-                <a:srgbClr val="000000"/>
-              </a:solidFill>
-            </a:endParaRPr>
-          </a:p>
-        </p:txBody>
-      </p:sp>
-      <p:sp>
-        <p:nvSpPr>
-          <p:cNvPr id="17" name="Rounded Rectangle 16"/>
-          <p:cNvSpPr/>
-          <p:nvPr/>
-        </p:nvSpPr>
-        <p:spPr>
-          <a:xfrm>
-            <a:off x="5227323" y="2330397"/>
-            <a:ext cx="887341" cy="628403"/>
-          </a:xfrm>
-          <a:prstGeom prst="roundRect">
-            <a:avLst/>
-          </a:prstGeom>
-        </p:spPr>
-        <p:style>
-          <a:lnRef idx="1">
-            <a:schemeClr val="accent1"/>
-          </a:lnRef>
-          <a:fillRef idx="3">
-            <a:schemeClr val="accent1"/>
-          </a:fillRef>
-          <a:effectRef idx="2">
-            <a:schemeClr val="accent1"/>
-          </a:effectRef>
-          <a:fontRef idx="minor">
-            <a:schemeClr val="lt1"/>
-          </a:fontRef>
-        </p:style>
-        <p:txBody>
-          <a:bodyPr rtlCol="0" anchor="ctr"/>
-          <a:lstStyle/>
-          <a:p>
-            <a:pPr algn="ctr"/>
-            <a:r>
-              <a:rPr lang="en-US" sz="1400" dirty="0" smtClean="0">
+              </a:endParaRPr>
+            </a:p>
+          </p:txBody>
+        </p:sp>
+        <p:sp>
+          <p:nvSpPr>
+            <p:cNvPr id="17" name="Rounded Rectangle 16"/>
+            <p:cNvSpPr/>
+            <p:nvPr/>
+          </p:nvSpPr>
+          <p:spPr>
+            <a:xfrm>
+              <a:off x="5227323" y="2330397"/>
+              <a:ext cx="887341" cy="628403"/>
+            </a:xfrm>
+            <a:prstGeom prst="roundRect">
+              <a:avLst/>
+            </a:prstGeom>
+          </p:spPr>
+          <p:style>
+            <a:lnRef idx="1">
+              <a:schemeClr val="accent1"/>
+            </a:lnRef>
+            <a:fillRef idx="3">
+              <a:schemeClr val="accent1"/>
+            </a:fillRef>
+            <a:effectRef idx="2">
+              <a:schemeClr val="accent1"/>
+            </a:effectRef>
+            <a:fontRef idx="minor">
+              <a:schemeClr val="lt1"/>
+            </a:fontRef>
+          </p:style>
+          <p:txBody>
+            <a:bodyPr rtlCol="0" anchor="ctr"/>
+            <a:lstStyle/>
+            <a:p>
+              <a:pPr algn="ctr"/>
+              <a:r>
+                <a:rPr lang="en-US" sz="1400" dirty="0" smtClean="0">
+                  <a:solidFill>
+                    <a:srgbClr val="000000"/>
+                  </a:solidFill>
+                </a:rPr>
+                <a:t>Cis-cis* (n=21)</a:t>
+              </a:r>
+              <a:endParaRPr lang="en-US" sz="1400" dirty="0">
                 <a:solidFill>
                   <a:srgbClr val="000000"/>
                 </a:solidFill>
-              </a:rPr>
-              <a:t>Cis-cis* (n=21)</a:t>
-            </a:r>
-            <a:endParaRPr lang="en-US" sz="1400" dirty="0">
-              <a:solidFill>
-                <a:srgbClr val="000000"/>
-              </a:solidFill>
-            </a:endParaRPr>
-          </a:p>
-        </p:txBody>
-      </p:sp>
-      <p:sp>
-        <p:nvSpPr>
-          <p:cNvPr id="18" name="Rounded Rectangle 17"/>
-          <p:cNvSpPr/>
-          <p:nvPr/>
-        </p:nvSpPr>
-        <p:spPr>
-          <a:xfrm>
-            <a:off x="6399570" y="2330398"/>
-            <a:ext cx="993177" cy="628403"/>
-          </a:xfrm>
-          <a:prstGeom prst="roundRect">
-            <a:avLst/>
-          </a:prstGeom>
-        </p:spPr>
-        <p:style>
-          <a:lnRef idx="1">
-            <a:schemeClr val="accent1"/>
-          </a:lnRef>
-          <a:fillRef idx="3">
-            <a:schemeClr val="accent1"/>
-          </a:fillRef>
-          <a:effectRef idx="2">
-            <a:schemeClr val="accent1"/>
-          </a:effectRef>
-          <a:fontRef idx="minor">
-            <a:schemeClr val="lt1"/>
-          </a:fontRef>
-        </p:style>
-        <p:txBody>
-          <a:bodyPr rtlCol="0" anchor="ctr"/>
-          <a:lstStyle/>
-          <a:p>
-            <a:pPr algn="ctr"/>
-            <a:r>
-              <a:rPr lang="en-US" sz="1400" dirty="0" smtClean="0">
+              </a:endParaRPr>
+            </a:p>
+          </p:txBody>
+        </p:sp>
+        <p:sp>
+          <p:nvSpPr>
+            <p:cNvPr id="18" name="Rounded Rectangle 17"/>
+            <p:cNvSpPr/>
+            <p:nvPr/>
+          </p:nvSpPr>
+          <p:spPr>
+            <a:xfrm>
+              <a:off x="6399570" y="2330398"/>
+              <a:ext cx="993177" cy="628403"/>
+            </a:xfrm>
+            <a:prstGeom prst="roundRect">
+              <a:avLst/>
+            </a:prstGeom>
+          </p:spPr>
+          <p:style>
+            <a:lnRef idx="1">
+              <a:schemeClr val="accent1"/>
+            </a:lnRef>
+            <a:fillRef idx="3">
+              <a:schemeClr val="accent1"/>
+            </a:fillRef>
+            <a:effectRef idx="2">
+              <a:schemeClr val="accent1"/>
+            </a:effectRef>
+            <a:fontRef idx="minor">
+              <a:schemeClr val="lt1"/>
+            </a:fontRef>
+          </p:style>
+          <p:txBody>
+            <a:bodyPr rtlCol="0" anchor="ctr"/>
+            <a:lstStyle/>
+            <a:p>
+              <a:pPr algn="ctr"/>
+              <a:r>
+                <a:rPr lang="en-US" sz="1400" dirty="0" smtClean="0">
+                  <a:solidFill>
+                    <a:srgbClr val="000000"/>
+                  </a:solidFill>
+                </a:rPr>
+                <a:t>Cis-trans (n=72)</a:t>
+              </a:r>
+              <a:endParaRPr lang="en-US" sz="1400" dirty="0">
                 <a:solidFill>
                   <a:srgbClr val="000000"/>
                 </a:solidFill>
-              </a:rPr>
-              <a:t>Cis-trans (n=72)</a:t>
-            </a:r>
-            <a:endParaRPr lang="en-US" sz="1400" dirty="0">
-              <a:solidFill>
-                <a:srgbClr val="000000"/>
-              </a:solidFill>
-            </a:endParaRPr>
-          </a:p>
-        </p:txBody>
-      </p:sp>
-      <p:sp>
-        <p:nvSpPr>
-          <p:cNvPr id="19" name="Rounded Rectangle 18"/>
-          <p:cNvSpPr/>
-          <p:nvPr/>
-        </p:nvSpPr>
-        <p:spPr>
-          <a:xfrm>
-            <a:off x="7620658" y="2330398"/>
-            <a:ext cx="969773" cy="628403"/>
-          </a:xfrm>
-          <a:prstGeom prst="roundRect">
-            <a:avLst/>
-          </a:prstGeom>
-        </p:spPr>
-        <p:style>
-          <a:lnRef idx="1">
-            <a:schemeClr val="accent1"/>
-          </a:lnRef>
-          <a:fillRef idx="3">
-            <a:schemeClr val="accent1"/>
-          </a:fillRef>
-          <a:effectRef idx="2">
-            <a:schemeClr val="accent1"/>
-          </a:effectRef>
-          <a:fontRef idx="minor">
-            <a:schemeClr val="lt1"/>
-          </a:fontRef>
-        </p:style>
-        <p:txBody>
-          <a:bodyPr rtlCol="0" anchor="ctr"/>
-          <a:lstStyle/>
-          <a:p>
-            <a:pPr algn="ctr"/>
-            <a:r>
-              <a:rPr lang="en-US" sz="1200" dirty="0" smtClean="0">
+              </a:endParaRPr>
+            </a:p>
+          </p:txBody>
+        </p:sp>
+        <p:sp>
+          <p:nvSpPr>
+            <p:cNvPr id="19" name="Rounded Rectangle 18"/>
+            <p:cNvSpPr/>
+            <p:nvPr/>
+          </p:nvSpPr>
+          <p:spPr>
+            <a:xfrm>
+              <a:off x="7620658" y="2330398"/>
+              <a:ext cx="969773" cy="628403"/>
+            </a:xfrm>
+            <a:prstGeom prst="roundRect">
+              <a:avLst/>
+            </a:prstGeom>
+          </p:spPr>
+          <p:style>
+            <a:lnRef idx="1">
+              <a:schemeClr val="accent1"/>
+            </a:lnRef>
+            <a:fillRef idx="3">
+              <a:schemeClr val="accent1"/>
+            </a:fillRef>
+            <a:effectRef idx="2">
+              <a:schemeClr val="accent1"/>
+            </a:effectRef>
+            <a:fontRef idx="minor">
+              <a:schemeClr val="lt1"/>
+            </a:fontRef>
+          </p:style>
+          <p:txBody>
+            <a:bodyPr rtlCol="0" anchor="ctr"/>
+            <a:lstStyle/>
+            <a:p>
+              <a:pPr algn="ctr"/>
+              <a:r>
+                <a:rPr lang="en-US" sz="1200" dirty="0" smtClean="0">
+                  <a:solidFill>
+                    <a:srgbClr val="000000"/>
+                  </a:solidFill>
+                </a:rPr>
+                <a:t>Trans-trans (n=2)</a:t>
+              </a:r>
+              <a:endParaRPr lang="en-US" sz="1200" dirty="0">
                 <a:solidFill>
                   <a:srgbClr val="000000"/>
                 </a:solidFill>
-              </a:rPr>
-              <a:t>Trans-trans (n=2)</a:t>
-            </a:r>
-            <a:endParaRPr lang="en-US" sz="1200" dirty="0">
-              <a:solidFill>
-                <a:srgbClr val="000000"/>
-              </a:solidFill>
-            </a:endParaRPr>
-          </a:p>
-        </p:txBody>
-      </p:sp>
-      <p:sp>
-        <p:nvSpPr>
-          <p:cNvPr id="20" name="Rounded Rectangle 19"/>
-          <p:cNvSpPr/>
-          <p:nvPr/>
-        </p:nvSpPr>
-        <p:spPr>
-          <a:xfrm>
-            <a:off x="3718177" y="3317229"/>
-            <a:ext cx="1345228" cy="869000"/>
-          </a:xfrm>
-          <a:prstGeom prst="roundRect">
-            <a:avLst/>
-          </a:prstGeom>
-        </p:spPr>
-        <p:style>
-          <a:lnRef idx="1">
-            <a:schemeClr val="accent1"/>
-          </a:lnRef>
-          <a:fillRef idx="3">
-            <a:schemeClr val="accent1"/>
-          </a:fillRef>
-          <a:effectRef idx="2">
-            <a:schemeClr val="accent1"/>
-          </a:effectRef>
-          <a:fontRef idx="minor">
-            <a:schemeClr val="lt1"/>
-          </a:fontRef>
-        </p:style>
-        <p:txBody>
-          <a:bodyPr rtlCol="0" anchor="ctr"/>
-          <a:lstStyle/>
-          <a:p>
-            <a:pPr algn="ctr"/>
-            <a:r>
-              <a:rPr lang="en-US" sz="1400" dirty="0" smtClean="0">
+              </a:endParaRPr>
+            </a:p>
+          </p:txBody>
+        </p:sp>
+        <p:sp>
+          <p:nvSpPr>
+            <p:cNvPr id="20" name="Rounded Rectangle 19"/>
+            <p:cNvSpPr/>
+            <p:nvPr/>
+          </p:nvSpPr>
+          <p:spPr>
+            <a:xfrm>
+              <a:off x="3718177" y="3317229"/>
+              <a:ext cx="1345228" cy="869000"/>
+            </a:xfrm>
+            <a:prstGeom prst="roundRect">
+              <a:avLst/>
+            </a:prstGeom>
+            <a:solidFill>
+              <a:schemeClr val="accent6">
+                <a:lumMod val="60000"/>
+                <a:lumOff val="40000"/>
+              </a:schemeClr>
+            </a:solidFill>
+          </p:spPr>
+          <p:style>
+            <a:lnRef idx="1">
+              <a:schemeClr val="accent1"/>
+            </a:lnRef>
+            <a:fillRef idx="3">
+              <a:schemeClr val="accent1"/>
+            </a:fillRef>
+            <a:effectRef idx="2">
+              <a:schemeClr val="accent1"/>
+            </a:effectRef>
+            <a:fontRef idx="minor">
+              <a:schemeClr val="lt1"/>
+            </a:fontRef>
+          </p:style>
+          <p:txBody>
+            <a:bodyPr rtlCol="0" anchor="ctr"/>
+            <a:lstStyle/>
+            <a:p>
+              <a:pPr algn="ctr"/>
+              <a:r>
+                <a:rPr lang="en-US" sz="1400" dirty="0" smtClean="0">
+                  <a:solidFill>
+                    <a:srgbClr val="000000"/>
+                  </a:solidFill>
+                </a:rPr>
+                <a:t>Permutation p &lt; 4.4e-6</a:t>
+              </a:r>
+              <a:endParaRPr lang="en-US" sz="1400" dirty="0">
                 <a:solidFill>
                   <a:srgbClr val="000000"/>
                 </a:solidFill>
-              </a:rPr>
-              <a:t>Permutation p &lt; 4.4e-6</a:t>
-            </a:r>
-            <a:endParaRPr lang="en-US" sz="1400" dirty="0">
-              <a:solidFill>
-                <a:srgbClr val="000000"/>
-              </a:solidFill>
-            </a:endParaRPr>
-          </a:p>
-        </p:txBody>
-      </p:sp>
-      <p:sp>
-        <p:nvSpPr>
-          <p:cNvPr id="21" name="Rounded Rectangle 20"/>
-          <p:cNvSpPr/>
-          <p:nvPr/>
-        </p:nvSpPr>
-        <p:spPr>
-          <a:xfrm>
-            <a:off x="3718177" y="4338629"/>
-            <a:ext cx="1345228" cy="869000"/>
-          </a:xfrm>
-          <a:prstGeom prst="roundRect">
-            <a:avLst/>
-          </a:prstGeom>
-        </p:spPr>
-        <p:style>
-          <a:lnRef idx="1">
-            <a:schemeClr val="accent1"/>
-          </a:lnRef>
-          <a:fillRef idx="3">
-            <a:schemeClr val="accent1"/>
-          </a:fillRef>
-          <a:effectRef idx="2">
-            <a:schemeClr val="accent1"/>
-          </a:effectRef>
-          <a:fontRef idx="minor">
-            <a:schemeClr val="lt1"/>
-          </a:fontRef>
-        </p:style>
-        <p:txBody>
-          <a:bodyPr rtlCol="0" anchor="ctr"/>
-          <a:lstStyle/>
-          <a:p>
-            <a:pPr algn="ctr"/>
-            <a:r>
-              <a:rPr lang="en-US" sz="1400" dirty="0" smtClean="0">
+              </a:endParaRPr>
+            </a:p>
+          </p:txBody>
+        </p:sp>
+        <p:sp>
+          <p:nvSpPr>
+            <p:cNvPr id="21" name="Rounded Rectangle 20"/>
+            <p:cNvSpPr/>
+            <p:nvPr/>
+          </p:nvSpPr>
+          <p:spPr>
+            <a:xfrm>
+              <a:off x="3718177" y="4338629"/>
+              <a:ext cx="1345228" cy="869000"/>
+            </a:xfrm>
+            <a:prstGeom prst="roundRect">
+              <a:avLst/>
+            </a:prstGeom>
+            <a:solidFill>
+              <a:schemeClr val="accent4">
+                <a:lumMod val="60000"/>
+                <a:lumOff val="40000"/>
+              </a:schemeClr>
+            </a:solidFill>
+          </p:spPr>
+          <p:style>
+            <a:lnRef idx="1">
+              <a:schemeClr val="accent1"/>
+            </a:lnRef>
+            <a:fillRef idx="3">
+              <a:schemeClr val="accent1"/>
+            </a:fillRef>
+            <a:effectRef idx="2">
+              <a:schemeClr val="accent1"/>
+            </a:effectRef>
+            <a:fontRef idx="minor">
+              <a:schemeClr val="lt1"/>
+            </a:fontRef>
+          </p:style>
+          <p:txBody>
+            <a:bodyPr rtlCol="0" anchor="ctr"/>
+            <a:lstStyle/>
+            <a:p>
+              <a:pPr algn="ctr"/>
+              <a:r>
+                <a:rPr lang="en-US" sz="1400" dirty="0" smtClean="0">
+                  <a:solidFill>
+                    <a:srgbClr val="000000"/>
+                  </a:solidFill>
+                </a:rPr>
+                <a:t>GWAS GC Lambda F correction p &lt; 4.48e-6</a:t>
+              </a:r>
+              <a:endParaRPr lang="en-US" sz="1400" dirty="0">
                 <a:solidFill>
                   <a:srgbClr val="000000"/>
                 </a:solidFill>
-              </a:rPr>
-              <a:t>GWAS GC Lambda F correction p &lt; 4.48e-6</a:t>
-            </a:r>
-            <a:endParaRPr lang="en-US" sz="1400" dirty="0">
-              <a:solidFill>
-                <a:srgbClr val="000000"/>
-              </a:solidFill>
-            </a:endParaRPr>
-          </a:p>
-        </p:txBody>
-      </p:sp>
-      <p:sp>
-        <p:nvSpPr>
-          <p:cNvPr id="22" name="Rounded Rectangle 21"/>
-          <p:cNvSpPr/>
-          <p:nvPr/>
-        </p:nvSpPr>
-        <p:spPr>
-          <a:xfrm>
-            <a:off x="3718177" y="5401806"/>
-            <a:ext cx="1345228" cy="869000"/>
-          </a:xfrm>
-          <a:prstGeom prst="roundRect">
-            <a:avLst/>
-          </a:prstGeom>
-        </p:spPr>
-        <p:style>
-          <a:lnRef idx="1">
-            <a:schemeClr val="accent1"/>
-          </a:lnRef>
-          <a:fillRef idx="3">
-            <a:schemeClr val="accent1"/>
-          </a:fillRef>
-          <a:effectRef idx="2">
-            <a:schemeClr val="accent1"/>
-          </a:effectRef>
-          <a:fontRef idx="minor">
-            <a:schemeClr val="lt1"/>
-          </a:fontRef>
-        </p:style>
-        <p:txBody>
-          <a:bodyPr rtlCol="0" anchor="ctr"/>
-          <a:lstStyle/>
-          <a:p>
-            <a:pPr algn="ctr"/>
-            <a:r>
-              <a:rPr lang="en-US" sz="1400" dirty="0" smtClean="0">
+              </a:endParaRPr>
+            </a:p>
+          </p:txBody>
+        </p:sp>
+        <p:sp>
+          <p:nvSpPr>
+            <p:cNvPr id="22" name="Rounded Rectangle 21"/>
+            <p:cNvSpPr/>
+            <p:nvPr/>
+          </p:nvSpPr>
+          <p:spPr>
+            <a:xfrm>
+              <a:off x="3718177" y="5401806"/>
+              <a:ext cx="1345228" cy="869000"/>
+            </a:xfrm>
+            <a:prstGeom prst="roundRect">
+              <a:avLst/>
+            </a:prstGeom>
+            <a:solidFill>
+              <a:schemeClr val="accent2">
+                <a:lumMod val="60000"/>
+                <a:lumOff val="40000"/>
+              </a:schemeClr>
+            </a:solidFill>
+          </p:spPr>
+          <p:style>
+            <a:lnRef idx="1">
+              <a:schemeClr val="accent1"/>
+            </a:lnRef>
+            <a:fillRef idx="3">
+              <a:schemeClr val="accent1"/>
+            </a:fillRef>
+            <a:effectRef idx="2">
+              <a:schemeClr val="accent1"/>
+            </a:effectRef>
+            <a:fontRef idx="minor">
+              <a:schemeClr val="lt1"/>
+            </a:fontRef>
+          </p:style>
+          <p:txBody>
+            <a:bodyPr rtlCol="0" anchor="ctr"/>
+            <a:lstStyle/>
+            <a:p>
+              <a:pPr algn="ctr"/>
+              <a:r>
+                <a:rPr lang="en-US" sz="1400" dirty="0" smtClean="0">
+                  <a:solidFill>
+                    <a:srgbClr val="000000"/>
+                  </a:solidFill>
+                </a:rPr>
+                <a:t>GWAS GC Lambda </a:t>
+              </a:r>
+              <a:r>
+                <a:rPr lang="en-US" sz="1400" dirty="0" err="1" smtClean="0">
+                  <a:solidFill>
+                    <a:srgbClr val="000000"/>
+                  </a:solidFill>
+                </a:rPr>
+                <a:t>Chisq</a:t>
+              </a:r>
+              <a:r>
+                <a:rPr lang="en-US" sz="1400" dirty="0" smtClean="0">
+                  <a:solidFill>
+                    <a:srgbClr val="000000"/>
+                  </a:solidFill>
+                </a:rPr>
+                <a:t> correction p &lt; 4.48e-6</a:t>
+              </a:r>
+              <a:endParaRPr lang="en-US" sz="1400" dirty="0">
                 <a:solidFill>
                   <a:srgbClr val="000000"/>
                 </a:solidFill>
-              </a:rPr>
-              <a:t>GWAS GC Lambda </a:t>
-            </a:r>
-            <a:r>
-              <a:rPr lang="en-US" sz="1400" dirty="0" err="1" smtClean="0">
+              </a:endParaRPr>
+            </a:p>
+          </p:txBody>
+        </p:sp>
+        <p:sp>
+          <p:nvSpPr>
+            <p:cNvPr id="23" name="Rounded Rectangle 22"/>
+            <p:cNvSpPr/>
+            <p:nvPr/>
+          </p:nvSpPr>
+          <p:spPr>
+            <a:xfrm>
+              <a:off x="293056" y="3556000"/>
+              <a:ext cx="887341" cy="381000"/>
+            </a:xfrm>
+            <a:prstGeom prst="roundRect">
+              <a:avLst/>
+            </a:prstGeom>
+            <a:solidFill>
+              <a:schemeClr val="accent6">
+                <a:lumMod val="60000"/>
+                <a:lumOff val="40000"/>
+              </a:schemeClr>
+            </a:solidFill>
+          </p:spPr>
+          <p:style>
+            <a:lnRef idx="1">
+              <a:schemeClr val="accent1"/>
+            </a:lnRef>
+            <a:fillRef idx="3">
+              <a:schemeClr val="accent1"/>
+            </a:fillRef>
+            <a:effectRef idx="2">
+              <a:schemeClr val="accent1"/>
+            </a:effectRef>
+            <a:fontRef idx="minor">
+              <a:schemeClr val="lt1"/>
+            </a:fontRef>
+          </p:style>
+          <p:txBody>
+            <a:bodyPr rtlCol="0" anchor="ctr"/>
+            <a:lstStyle/>
+            <a:p>
+              <a:pPr algn="ctr"/>
+              <a:r>
+                <a:rPr lang="en-US" dirty="0" smtClean="0">
+                  <a:solidFill>
+                    <a:srgbClr val="000000"/>
+                  </a:solidFill>
+                </a:rPr>
+                <a:t>18</a:t>
+              </a:r>
+              <a:endParaRPr lang="en-US" dirty="0">
                 <a:solidFill>
                   <a:srgbClr val="000000"/>
                 </a:solidFill>
-              </a:rPr>
-              <a:t>Chisq</a:t>
-            </a:r>
-            <a:r>
-              <a:rPr lang="en-US" sz="1400" dirty="0" smtClean="0">
+              </a:endParaRPr>
+            </a:p>
+          </p:txBody>
+        </p:sp>
+        <p:sp>
+          <p:nvSpPr>
+            <p:cNvPr id="24" name="Rounded Rectangle 23"/>
+            <p:cNvSpPr/>
+            <p:nvPr/>
+          </p:nvSpPr>
+          <p:spPr>
+            <a:xfrm>
+              <a:off x="1533039" y="3556000"/>
+              <a:ext cx="887341" cy="381000"/>
+            </a:xfrm>
+            <a:prstGeom prst="roundRect">
+              <a:avLst/>
+            </a:prstGeom>
+            <a:solidFill>
+              <a:schemeClr val="accent6">
+                <a:lumMod val="60000"/>
+                <a:lumOff val="40000"/>
+              </a:schemeClr>
+            </a:solidFill>
+          </p:spPr>
+          <p:style>
+            <a:lnRef idx="1">
+              <a:schemeClr val="accent1"/>
+            </a:lnRef>
+            <a:fillRef idx="3">
+              <a:schemeClr val="accent1"/>
+            </a:fillRef>
+            <a:effectRef idx="2">
+              <a:schemeClr val="accent1"/>
+            </a:effectRef>
+            <a:fontRef idx="minor">
+              <a:schemeClr val="lt1"/>
+            </a:fontRef>
+          </p:style>
+          <p:txBody>
+            <a:bodyPr rtlCol="0" anchor="ctr"/>
+            <a:lstStyle/>
+            <a:p>
+              <a:pPr algn="ctr"/>
+              <a:r>
+                <a:rPr lang="en-US" dirty="0" smtClean="0">
+                  <a:solidFill>
+                    <a:srgbClr val="000000"/>
+                  </a:solidFill>
+                </a:rPr>
+                <a:t>237</a:t>
+              </a:r>
+              <a:endParaRPr lang="en-US" dirty="0">
                 <a:solidFill>
                   <a:srgbClr val="000000"/>
                 </a:solidFill>
-              </a:rPr>
-              <a:t> correction p &lt; 4.48e-6</a:t>
-            </a:r>
-            <a:endParaRPr lang="en-US" sz="1400" dirty="0">
-              <a:solidFill>
-                <a:srgbClr val="000000"/>
-              </a:solidFill>
-            </a:endParaRPr>
-          </a:p>
-        </p:txBody>
-      </p:sp>
+              </a:endParaRPr>
+            </a:p>
+          </p:txBody>
+        </p:sp>
+        <p:sp>
+          <p:nvSpPr>
+            <p:cNvPr id="25" name="Rounded Rectangle 24"/>
+            <p:cNvSpPr/>
+            <p:nvPr/>
+          </p:nvSpPr>
+          <p:spPr>
+            <a:xfrm>
+              <a:off x="2686391" y="3556000"/>
+              <a:ext cx="887341" cy="381000"/>
+            </a:xfrm>
+            <a:prstGeom prst="roundRect">
+              <a:avLst/>
+            </a:prstGeom>
+            <a:solidFill>
+              <a:schemeClr val="accent6">
+                <a:lumMod val="60000"/>
+                <a:lumOff val="40000"/>
+              </a:schemeClr>
+            </a:solidFill>
+          </p:spPr>
+          <p:style>
+            <a:lnRef idx="1">
+              <a:schemeClr val="accent1"/>
+            </a:lnRef>
+            <a:fillRef idx="3">
+              <a:schemeClr val="accent1"/>
+            </a:fillRef>
+            <a:effectRef idx="2">
+              <a:schemeClr val="accent1"/>
+            </a:effectRef>
+            <a:fontRef idx="minor">
+              <a:schemeClr val="lt1"/>
+            </a:fontRef>
+          </p:style>
+          <p:txBody>
+            <a:bodyPr rtlCol="0" anchor="ctr"/>
+            <a:lstStyle/>
+            <a:p>
+              <a:pPr algn="ctr"/>
+              <a:r>
+                <a:rPr lang="en-US" dirty="0" smtClean="0">
+                  <a:solidFill>
+                    <a:srgbClr val="000000"/>
+                  </a:solidFill>
+                </a:rPr>
+                <a:t>10</a:t>
+              </a:r>
+              <a:endParaRPr lang="en-US" dirty="0">
+                <a:solidFill>
+                  <a:srgbClr val="000000"/>
+                </a:solidFill>
+              </a:endParaRPr>
+            </a:p>
+          </p:txBody>
+        </p:sp>
+        <p:sp>
+          <p:nvSpPr>
+            <p:cNvPr id="26" name="Rounded Rectangle 25"/>
+            <p:cNvSpPr/>
+            <p:nvPr/>
+          </p:nvSpPr>
+          <p:spPr>
+            <a:xfrm>
+              <a:off x="5309755" y="3556000"/>
+              <a:ext cx="887341" cy="381000"/>
+            </a:xfrm>
+            <a:prstGeom prst="roundRect">
+              <a:avLst/>
+            </a:prstGeom>
+            <a:solidFill>
+              <a:schemeClr val="accent6">
+                <a:lumMod val="60000"/>
+                <a:lumOff val="40000"/>
+              </a:schemeClr>
+            </a:solidFill>
+          </p:spPr>
+          <p:style>
+            <a:lnRef idx="1">
+              <a:schemeClr val="accent1"/>
+            </a:lnRef>
+            <a:fillRef idx="3">
+              <a:schemeClr val="accent1"/>
+            </a:fillRef>
+            <a:effectRef idx="2">
+              <a:schemeClr val="accent1"/>
+            </a:effectRef>
+            <a:fontRef idx="minor">
+              <a:schemeClr val="lt1"/>
+            </a:fontRef>
+          </p:style>
+          <p:txBody>
+            <a:bodyPr rtlCol="0" anchor="ctr"/>
+            <a:lstStyle/>
+            <a:p>
+              <a:pPr algn="ctr"/>
+              <a:r>
+                <a:rPr lang="en-US" dirty="0" smtClean="0">
+                  <a:solidFill>
+                    <a:srgbClr val="000000"/>
+                  </a:solidFill>
+                </a:rPr>
+                <a:t>14</a:t>
+              </a:r>
+              <a:endParaRPr lang="en-US" dirty="0">
+                <a:solidFill>
+                  <a:srgbClr val="000000"/>
+                </a:solidFill>
+              </a:endParaRPr>
+            </a:p>
+          </p:txBody>
+        </p:sp>
+        <p:sp>
+          <p:nvSpPr>
+            <p:cNvPr id="27" name="Rounded Rectangle 26"/>
+            <p:cNvSpPr/>
+            <p:nvPr/>
+          </p:nvSpPr>
+          <p:spPr>
+            <a:xfrm>
+              <a:off x="6549738" y="3556000"/>
+              <a:ext cx="887341" cy="381000"/>
+            </a:xfrm>
+            <a:prstGeom prst="roundRect">
+              <a:avLst/>
+            </a:prstGeom>
+            <a:solidFill>
+              <a:schemeClr val="accent6">
+                <a:lumMod val="60000"/>
+                <a:lumOff val="40000"/>
+              </a:schemeClr>
+            </a:solidFill>
+          </p:spPr>
+          <p:style>
+            <a:lnRef idx="1">
+              <a:schemeClr val="accent1"/>
+            </a:lnRef>
+            <a:fillRef idx="3">
+              <a:schemeClr val="accent1"/>
+            </a:fillRef>
+            <a:effectRef idx="2">
+              <a:schemeClr val="accent1"/>
+            </a:effectRef>
+            <a:fontRef idx="minor">
+              <a:schemeClr val="lt1"/>
+            </a:fontRef>
+          </p:style>
+          <p:txBody>
+            <a:bodyPr rtlCol="0" anchor="ctr"/>
+            <a:lstStyle/>
+            <a:p>
+              <a:pPr algn="ctr"/>
+              <a:r>
+                <a:rPr lang="en-US" dirty="0" smtClean="0">
+                  <a:solidFill>
+                    <a:srgbClr val="000000"/>
+                  </a:solidFill>
+                </a:rPr>
+                <a:t>47</a:t>
+              </a:r>
+              <a:endParaRPr lang="en-US" dirty="0">
+                <a:solidFill>
+                  <a:srgbClr val="000000"/>
+                </a:solidFill>
+              </a:endParaRPr>
+            </a:p>
+          </p:txBody>
+        </p:sp>
+        <p:sp>
+          <p:nvSpPr>
+            <p:cNvPr id="28" name="Rounded Rectangle 27"/>
+            <p:cNvSpPr/>
+            <p:nvPr/>
+          </p:nvSpPr>
+          <p:spPr>
+            <a:xfrm>
+              <a:off x="7703090" y="3556000"/>
+              <a:ext cx="887341" cy="381000"/>
+            </a:xfrm>
+            <a:prstGeom prst="roundRect">
+              <a:avLst/>
+            </a:prstGeom>
+            <a:solidFill>
+              <a:schemeClr val="accent6">
+                <a:lumMod val="60000"/>
+                <a:lumOff val="40000"/>
+              </a:schemeClr>
+            </a:solidFill>
+          </p:spPr>
+          <p:style>
+            <a:lnRef idx="1">
+              <a:schemeClr val="accent1"/>
+            </a:lnRef>
+            <a:fillRef idx="3">
+              <a:schemeClr val="accent1"/>
+            </a:fillRef>
+            <a:effectRef idx="2">
+              <a:schemeClr val="accent1"/>
+            </a:effectRef>
+            <a:fontRef idx="minor">
+              <a:schemeClr val="lt1"/>
+            </a:fontRef>
+          </p:style>
+          <p:txBody>
+            <a:bodyPr rtlCol="0" anchor="ctr"/>
+            <a:lstStyle/>
+            <a:p>
+              <a:pPr algn="ctr"/>
+              <a:r>
+                <a:rPr lang="en-US" dirty="0" smtClean="0">
+                  <a:solidFill>
+                    <a:srgbClr val="000000"/>
+                  </a:solidFill>
+                </a:rPr>
+                <a:t>0</a:t>
+              </a:r>
+              <a:endParaRPr lang="en-US" dirty="0">
+                <a:solidFill>
+                  <a:srgbClr val="000000"/>
+                </a:solidFill>
+              </a:endParaRPr>
+            </a:p>
+          </p:txBody>
+        </p:sp>
+        <p:sp>
+          <p:nvSpPr>
+            <p:cNvPr id="29" name="Rounded Rectangle 28"/>
+            <p:cNvSpPr/>
+            <p:nvPr/>
+          </p:nvSpPr>
+          <p:spPr>
+            <a:xfrm>
+              <a:off x="293056" y="4533900"/>
+              <a:ext cx="887341" cy="381000"/>
+            </a:xfrm>
+            <a:prstGeom prst="roundRect">
+              <a:avLst/>
+            </a:prstGeom>
+            <a:solidFill>
+              <a:schemeClr val="accent4">
+                <a:lumMod val="60000"/>
+                <a:lumOff val="40000"/>
+              </a:schemeClr>
+            </a:solidFill>
+          </p:spPr>
+          <p:style>
+            <a:lnRef idx="1">
+              <a:schemeClr val="accent1"/>
+            </a:lnRef>
+            <a:fillRef idx="3">
+              <a:schemeClr val="accent1"/>
+            </a:fillRef>
+            <a:effectRef idx="2">
+              <a:schemeClr val="accent1"/>
+            </a:effectRef>
+            <a:fontRef idx="minor">
+              <a:schemeClr val="lt1"/>
+            </a:fontRef>
+          </p:style>
+          <p:txBody>
+            <a:bodyPr rtlCol="0" anchor="ctr"/>
+            <a:lstStyle/>
+            <a:p>
+              <a:pPr algn="ctr"/>
+              <a:r>
+                <a:rPr lang="en-US" dirty="0" smtClean="0">
+                  <a:solidFill>
+                    <a:srgbClr val="000000"/>
+                  </a:solidFill>
+                </a:rPr>
+                <a:t>10</a:t>
+              </a:r>
+              <a:endParaRPr lang="en-US" dirty="0">
+                <a:solidFill>
+                  <a:srgbClr val="000000"/>
+                </a:solidFill>
+              </a:endParaRPr>
+            </a:p>
+          </p:txBody>
+        </p:sp>
+        <p:sp>
+          <p:nvSpPr>
+            <p:cNvPr id="30" name="Rounded Rectangle 29"/>
+            <p:cNvSpPr/>
+            <p:nvPr/>
+          </p:nvSpPr>
+          <p:spPr>
+            <a:xfrm>
+              <a:off x="1533039" y="4533900"/>
+              <a:ext cx="887341" cy="381000"/>
+            </a:xfrm>
+            <a:prstGeom prst="roundRect">
+              <a:avLst/>
+            </a:prstGeom>
+            <a:solidFill>
+              <a:schemeClr val="accent4">
+                <a:lumMod val="60000"/>
+                <a:lumOff val="40000"/>
+              </a:schemeClr>
+            </a:solidFill>
+          </p:spPr>
+          <p:style>
+            <a:lnRef idx="1">
+              <a:schemeClr val="accent1"/>
+            </a:lnRef>
+            <a:fillRef idx="3">
+              <a:schemeClr val="accent1"/>
+            </a:fillRef>
+            <a:effectRef idx="2">
+              <a:schemeClr val="accent1"/>
+            </a:effectRef>
+            <a:fontRef idx="minor">
+              <a:schemeClr val="lt1"/>
+            </a:fontRef>
+          </p:style>
+          <p:txBody>
+            <a:bodyPr rtlCol="0" anchor="ctr"/>
+            <a:lstStyle/>
+            <a:p>
+              <a:pPr algn="ctr"/>
+              <a:r>
+                <a:rPr lang="en-US" dirty="0" smtClean="0">
+                  <a:solidFill>
+                    <a:srgbClr val="000000"/>
+                  </a:solidFill>
+                </a:rPr>
+                <a:t>134</a:t>
+              </a:r>
+              <a:endParaRPr lang="en-US" dirty="0">
+                <a:solidFill>
+                  <a:srgbClr val="000000"/>
+                </a:solidFill>
+              </a:endParaRPr>
+            </a:p>
+          </p:txBody>
+        </p:sp>
+        <p:sp>
+          <p:nvSpPr>
+            <p:cNvPr id="31" name="Rounded Rectangle 30"/>
+            <p:cNvSpPr/>
+            <p:nvPr/>
+          </p:nvSpPr>
+          <p:spPr>
+            <a:xfrm>
+              <a:off x="2686391" y="4533900"/>
+              <a:ext cx="887341" cy="381000"/>
+            </a:xfrm>
+            <a:prstGeom prst="roundRect">
+              <a:avLst/>
+            </a:prstGeom>
+            <a:solidFill>
+              <a:schemeClr val="accent4">
+                <a:lumMod val="60000"/>
+                <a:lumOff val="40000"/>
+              </a:schemeClr>
+            </a:solidFill>
+          </p:spPr>
+          <p:style>
+            <a:lnRef idx="1">
+              <a:schemeClr val="accent1"/>
+            </a:lnRef>
+            <a:fillRef idx="3">
+              <a:schemeClr val="accent1"/>
+            </a:fillRef>
+            <a:effectRef idx="2">
+              <a:schemeClr val="accent1"/>
+            </a:effectRef>
+            <a:fontRef idx="minor">
+              <a:schemeClr val="lt1"/>
+            </a:fontRef>
+          </p:style>
+          <p:txBody>
+            <a:bodyPr rtlCol="0" anchor="ctr"/>
+            <a:lstStyle/>
+            <a:p>
+              <a:pPr algn="ctr"/>
+              <a:r>
+                <a:rPr lang="en-US" dirty="0" smtClean="0">
+                  <a:solidFill>
+                    <a:srgbClr val="000000"/>
+                  </a:solidFill>
+                </a:rPr>
+                <a:t>1</a:t>
+              </a:r>
+              <a:endParaRPr lang="en-US" dirty="0">
+                <a:solidFill>
+                  <a:srgbClr val="000000"/>
+                </a:solidFill>
+              </a:endParaRPr>
+            </a:p>
+          </p:txBody>
+        </p:sp>
+        <p:sp>
+          <p:nvSpPr>
+            <p:cNvPr id="32" name="Rounded Rectangle 31"/>
+            <p:cNvSpPr/>
+            <p:nvPr/>
+          </p:nvSpPr>
+          <p:spPr>
+            <a:xfrm>
+              <a:off x="5309755" y="4533900"/>
+              <a:ext cx="887341" cy="381000"/>
+            </a:xfrm>
+            <a:prstGeom prst="roundRect">
+              <a:avLst/>
+            </a:prstGeom>
+            <a:solidFill>
+              <a:schemeClr val="accent4">
+                <a:lumMod val="60000"/>
+                <a:lumOff val="40000"/>
+              </a:schemeClr>
+            </a:solidFill>
+          </p:spPr>
+          <p:style>
+            <a:lnRef idx="1">
+              <a:schemeClr val="accent1"/>
+            </a:lnRef>
+            <a:fillRef idx="3">
+              <a:schemeClr val="accent1"/>
+            </a:fillRef>
+            <a:effectRef idx="2">
+              <a:schemeClr val="accent1"/>
+            </a:effectRef>
+            <a:fontRef idx="minor">
+              <a:schemeClr val="lt1"/>
+            </a:fontRef>
+          </p:style>
+          <p:txBody>
+            <a:bodyPr rtlCol="0" anchor="ctr"/>
+            <a:lstStyle/>
+            <a:p>
+              <a:pPr algn="ctr"/>
+              <a:r>
+                <a:rPr lang="en-US" dirty="0" smtClean="0">
+                  <a:solidFill>
+                    <a:srgbClr val="000000"/>
+                  </a:solidFill>
+                </a:rPr>
+                <a:t>11</a:t>
+              </a:r>
+              <a:endParaRPr lang="en-US" dirty="0">
+                <a:solidFill>
+                  <a:srgbClr val="000000"/>
+                </a:solidFill>
+              </a:endParaRPr>
+            </a:p>
+          </p:txBody>
+        </p:sp>
+        <p:sp>
+          <p:nvSpPr>
+            <p:cNvPr id="33" name="Rounded Rectangle 32"/>
+            <p:cNvSpPr/>
+            <p:nvPr/>
+          </p:nvSpPr>
+          <p:spPr>
+            <a:xfrm>
+              <a:off x="6549738" y="4533900"/>
+              <a:ext cx="887341" cy="381000"/>
+            </a:xfrm>
+            <a:prstGeom prst="roundRect">
+              <a:avLst/>
+            </a:prstGeom>
+            <a:solidFill>
+              <a:schemeClr val="accent4">
+                <a:lumMod val="60000"/>
+                <a:lumOff val="40000"/>
+              </a:schemeClr>
+            </a:solidFill>
+          </p:spPr>
+          <p:style>
+            <a:lnRef idx="1">
+              <a:schemeClr val="accent1"/>
+            </a:lnRef>
+            <a:fillRef idx="3">
+              <a:schemeClr val="accent1"/>
+            </a:fillRef>
+            <a:effectRef idx="2">
+              <a:schemeClr val="accent1"/>
+            </a:effectRef>
+            <a:fontRef idx="minor">
+              <a:schemeClr val="lt1"/>
+            </a:fontRef>
+          </p:style>
+          <p:txBody>
+            <a:bodyPr rtlCol="0" anchor="ctr"/>
+            <a:lstStyle/>
+            <a:p>
+              <a:pPr algn="ctr"/>
+              <a:r>
+                <a:rPr lang="en-US" dirty="0" smtClean="0">
+                  <a:solidFill>
+                    <a:srgbClr val="000000"/>
+                  </a:solidFill>
+                </a:rPr>
+                <a:t>53</a:t>
+              </a:r>
+              <a:endParaRPr lang="en-US" dirty="0">
+                <a:solidFill>
+                  <a:srgbClr val="000000"/>
+                </a:solidFill>
+              </a:endParaRPr>
+            </a:p>
+          </p:txBody>
+        </p:sp>
+        <p:sp>
+          <p:nvSpPr>
+            <p:cNvPr id="34" name="Rounded Rectangle 33"/>
+            <p:cNvSpPr/>
+            <p:nvPr/>
+          </p:nvSpPr>
+          <p:spPr>
+            <a:xfrm>
+              <a:off x="7703090" y="4533900"/>
+              <a:ext cx="887341" cy="381000"/>
+            </a:xfrm>
+            <a:prstGeom prst="roundRect">
+              <a:avLst/>
+            </a:prstGeom>
+            <a:solidFill>
+              <a:schemeClr val="accent4">
+                <a:lumMod val="60000"/>
+                <a:lumOff val="40000"/>
+              </a:schemeClr>
+            </a:solidFill>
+          </p:spPr>
+          <p:style>
+            <a:lnRef idx="1">
+              <a:schemeClr val="accent1"/>
+            </a:lnRef>
+            <a:fillRef idx="3">
+              <a:schemeClr val="accent1"/>
+            </a:fillRef>
+            <a:effectRef idx="2">
+              <a:schemeClr val="accent1"/>
+            </a:effectRef>
+            <a:fontRef idx="minor">
+              <a:schemeClr val="lt1"/>
+            </a:fontRef>
+          </p:style>
+          <p:txBody>
+            <a:bodyPr rtlCol="0" anchor="ctr"/>
+            <a:lstStyle/>
+            <a:p>
+              <a:pPr algn="ctr"/>
+              <a:r>
+                <a:rPr lang="en-US" dirty="0" smtClean="0">
+                  <a:solidFill>
+                    <a:srgbClr val="000000"/>
+                  </a:solidFill>
+                </a:rPr>
+                <a:t>1</a:t>
+              </a:r>
+              <a:endParaRPr lang="en-US" dirty="0">
+                <a:solidFill>
+                  <a:srgbClr val="000000"/>
+                </a:solidFill>
+              </a:endParaRPr>
+            </a:p>
+          </p:txBody>
+        </p:sp>
+        <p:sp>
+          <p:nvSpPr>
+            <p:cNvPr id="35" name="Rounded Rectangle 34"/>
+            <p:cNvSpPr/>
+            <p:nvPr/>
+          </p:nvSpPr>
+          <p:spPr>
+            <a:xfrm>
+              <a:off x="293056" y="5537200"/>
+              <a:ext cx="887341" cy="381000"/>
+            </a:xfrm>
+            <a:prstGeom prst="roundRect">
+              <a:avLst/>
+            </a:prstGeom>
+            <a:solidFill>
+              <a:schemeClr val="accent2">
+                <a:lumMod val="60000"/>
+                <a:lumOff val="40000"/>
+              </a:schemeClr>
+            </a:solidFill>
+          </p:spPr>
+          <p:style>
+            <a:lnRef idx="1">
+              <a:schemeClr val="accent1"/>
+            </a:lnRef>
+            <a:fillRef idx="3">
+              <a:schemeClr val="accent1"/>
+            </a:fillRef>
+            <a:effectRef idx="2">
+              <a:schemeClr val="accent1"/>
+            </a:effectRef>
+            <a:fontRef idx="minor">
+              <a:schemeClr val="lt1"/>
+            </a:fontRef>
+          </p:style>
+          <p:txBody>
+            <a:bodyPr rtlCol="0" anchor="ctr"/>
+            <a:lstStyle/>
+            <a:p>
+              <a:pPr algn="ctr"/>
+              <a:r>
+                <a:rPr lang="en-US" dirty="0" smtClean="0">
+                  <a:solidFill>
+                    <a:srgbClr val="000000"/>
+                  </a:solidFill>
+                </a:rPr>
+                <a:t>7</a:t>
+              </a:r>
+              <a:endParaRPr lang="en-US" dirty="0">
+                <a:solidFill>
+                  <a:srgbClr val="000000"/>
+                </a:solidFill>
+              </a:endParaRPr>
+            </a:p>
+          </p:txBody>
+        </p:sp>
+        <p:sp>
+          <p:nvSpPr>
+            <p:cNvPr id="36" name="Rounded Rectangle 35"/>
+            <p:cNvSpPr/>
+            <p:nvPr/>
+          </p:nvSpPr>
+          <p:spPr>
+            <a:xfrm>
+              <a:off x="1533039" y="5537200"/>
+              <a:ext cx="887341" cy="381000"/>
+            </a:xfrm>
+            <a:prstGeom prst="roundRect">
+              <a:avLst/>
+            </a:prstGeom>
+            <a:solidFill>
+              <a:schemeClr val="accent2">
+                <a:lumMod val="60000"/>
+                <a:lumOff val="40000"/>
+              </a:schemeClr>
+            </a:solidFill>
+          </p:spPr>
+          <p:style>
+            <a:lnRef idx="1">
+              <a:schemeClr val="accent1"/>
+            </a:lnRef>
+            <a:fillRef idx="3">
+              <a:schemeClr val="accent1"/>
+            </a:fillRef>
+            <a:effectRef idx="2">
+              <a:schemeClr val="accent1"/>
+            </a:effectRef>
+            <a:fontRef idx="minor">
+              <a:schemeClr val="lt1"/>
+            </a:fontRef>
+          </p:style>
+          <p:txBody>
+            <a:bodyPr rtlCol="0" anchor="ctr"/>
+            <a:lstStyle/>
+            <a:p>
+              <a:pPr algn="ctr"/>
+              <a:r>
+                <a:rPr lang="en-US" dirty="0" smtClean="0">
+                  <a:solidFill>
+                    <a:srgbClr val="000000"/>
+                  </a:solidFill>
+                </a:rPr>
+                <a:t>87</a:t>
+              </a:r>
+              <a:endParaRPr lang="en-US" dirty="0">
+                <a:solidFill>
+                  <a:srgbClr val="000000"/>
+                </a:solidFill>
+              </a:endParaRPr>
+            </a:p>
+          </p:txBody>
+        </p:sp>
+        <p:sp>
+          <p:nvSpPr>
+            <p:cNvPr id="37" name="Rounded Rectangle 36"/>
+            <p:cNvSpPr/>
+            <p:nvPr/>
+          </p:nvSpPr>
+          <p:spPr>
+            <a:xfrm>
+              <a:off x="2686391" y="5537200"/>
+              <a:ext cx="887341" cy="381000"/>
+            </a:xfrm>
+            <a:prstGeom prst="roundRect">
+              <a:avLst/>
+            </a:prstGeom>
+            <a:solidFill>
+              <a:schemeClr val="accent2">
+                <a:lumMod val="60000"/>
+                <a:lumOff val="40000"/>
+              </a:schemeClr>
+            </a:solidFill>
+          </p:spPr>
+          <p:style>
+            <a:lnRef idx="1">
+              <a:schemeClr val="accent1"/>
+            </a:lnRef>
+            <a:fillRef idx="3">
+              <a:schemeClr val="accent1"/>
+            </a:fillRef>
+            <a:effectRef idx="2">
+              <a:schemeClr val="accent1"/>
+            </a:effectRef>
+            <a:fontRef idx="minor">
+              <a:schemeClr val="lt1"/>
+            </a:fontRef>
+          </p:style>
+          <p:txBody>
+            <a:bodyPr rtlCol="0" anchor="ctr"/>
+            <a:lstStyle/>
+            <a:p>
+              <a:pPr algn="ctr"/>
+              <a:r>
+                <a:rPr lang="en-US" dirty="0" smtClean="0">
+                  <a:solidFill>
+                    <a:srgbClr val="000000"/>
+                  </a:solidFill>
+                </a:rPr>
+                <a:t>1</a:t>
+              </a:r>
+              <a:endParaRPr lang="en-US" dirty="0">
+                <a:solidFill>
+                  <a:srgbClr val="000000"/>
+                </a:solidFill>
+              </a:endParaRPr>
+            </a:p>
+          </p:txBody>
+        </p:sp>
+        <p:sp>
+          <p:nvSpPr>
+            <p:cNvPr id="38" name="Rounded Rectangle 37"/>
+            <p:cNvSpPr/>
+            <p:nvPr/>
+          </p:nvSpPr>
+          <p:spPr>
+            <a:xfrm>
+              <a:off x="5309755" y="5537200"/>
+              <a:ext cx="887341" cy="381000"/>
+            </a:xfrm>
+            <a:prstGeom prst="roundRect">
+              <a:avLst/>
+            </a:prstGeom>
+            <a:solidFill>
+              <a:schemeClr val="accent2">
+                <a:lumMod val="60000"/>
+                <a:lumOff val="40000"/>
+              </a:schemeClr>
+            </a:solidFill>
+          </p:spPr>
+          <p:style>
+            <a:lnRef idx="1">
+              <a:schemeClr val="accent1"/>
+            </a:lnRef>
+            <a:fillRef idx="3">
+              <a:schemeClr val="accent1"/>
+            </a:fillRef>
+            <a:effectRef idx="2">
+              <a:schemeClr val="accent1"/>
+            </a:effectRef>
+            <a:fontRef idx="minor">
+              <a:schemeClr val="lt1"/>
+            </a:fontRef>
+          </p:style>
+          <p:txBody>
+            <a:bodyPr rtlCol="0" anchor="ctr"/>
+            <a:lstStyle/>
+            <a:p>
+              <a:pPr algn="ctr"/>
+              <a:r>
+                <a:rPr lang="en-US" dirty="0" smtClean="0">
+                  <a:solidFill>
+                    <a:srgbClr val="000000"/>
+                  </a:solidFill>
+                </a:rPr>
+                <a:t>8</a:t>
+              </a:r>
+              <a:endParaRPr lang="en-US" dirty="0">
+                <a:solidFill>
+                  <a:srgbClr val="000000"/>
+                </a:solidFill>
+              </a:endParaRPr>
+            </a:p>
+          </p:txBody>
+        </p:sp>
+        <p:sp>
+          <p:nvSpPr>
+            <p:cNvPr id="39" name="Rounded Rectangle 38"/>
+            <p:cNvSpPr/>
+            <p:nvPr/>
+          </p:nvSpPr>
+          <p:spPr>
+            <a:xfrm>
+              <a:off x="6549738" y="5537200"/>
+              <a:ext cx="887341" cy="381000"/>
+            </a:xfrm>
+            <a:prstGeom prst="roundRect">
+              <a:avLst/>
+            </a:prstGeom>
+            <a:solidFill>
+              <a:schemeClr val="accent2">
+                <a:lumMod val="60000"/>
+                <a:lumOff val="40000"/>
+              </a:schemeClr>
+            </a:solidFill>
+          </p:spPr>
+          <p:style>
+            <a:lnRef idx="1">
+              <a:schemeClr val="accent1"/>
+            </a:lnRef>
+            <a:fillRef idx="3">
+              <a:schemeClr val="accent1"/>
+            </a:fillRef>
+            <a:effectRef idx="2">
+              <a:schemeClr val="accent1"/>
+            </a:effectRef>
+            <a:fontRef idx="minor">
+              <a:schemeClr val="lt1"/>
+            </a:fontRef>
+          </p:style>
+          <p:txBody>
+            <a:bodyPr rtlCol="0" anchor="ctr"/>
+            <a:lstStyle/>
+            <a:p>
+              <a:pPr algn="ctr"/>
+              <a:r>
+                <a:rPr lang="en-US" dirty="0" smtClean="0">
+                  <a:solidFill>
+                    <a:srgbClr val="000000"/>
+                  </a:solidFill>
+                </a:rPr>
+                <a:t>46</a:t>
+              </a:r>
+              <a:endParaRPr lang="en-US" dirty="0">
+                <a:solidFill>
+                  <a:srgbClr val="000000"/>
+                </a:solidFill>
+              </a:endParaRPr>
+            </a:p>
+          </p:txBody>
+        </p:sp>
+        <p:sp>
+          <p:nvSpPr>
+            <p:cNvPr id="40" name="Rounded Rectangle 39"/>
+            <p:cNvSpPr/>
+            <p:nvPr/>
+          </p:nvSpPr>
+          <p:spPr>
+            <a:xfrm>
+              <a:off x="7703090" y="5537200"/>
+              <a:ext cx="887341" cy="381000"/>
+            </a:xfrm>
+            <a:prstGeom prst="roundRect">
+              <a:avLst/>
+            </a:prstGeom>
+            <a:solidFill>
+              <a:schemeClr val="accent2">
+                <a:lumMod val="60000"/>
+                <a:lumOff val="40000"/>
+              </a:schemeClr>
+            </a:solidFill>
+          </p:spPr>
+          <p:style>
+            <a:lnRef idx="1">
+              <a:schemeClr val="accent1"/>
+            </a:lnRef>
+            <a:fillRef idx="3">
+              <a:schemeClr val="accent1"/>
+            </a:fillRef>
+            <a:effectRef idx="2">
+              <a:schemeClr val="accent1"/>
+            </a:effectRef>
+            <a:fontRef idx="minor">
+              <a:schemeClr val="lt1"/>
+            </a:fontRef>
+          </p:style>
+          <p:txBody>
+            <a:bodyPr rtlCol="0" anchor="ctr"/>
+            <a:lstStyle/>
+            <a:p>
+              <a:pPr algn="ctr"/>
+              <a:r>
+                <a:rPr lang="en-US" dirty="0" smtClean="0">
+                  <a:solidFill>
+                    <a:srgbClr val="000000"/>
+                  </a:solidFill>
+                </a:rPr>
+                <a:t>0</a:t>
+              </a:r>
+              <a:endParaRPr lang="en-US" dirty="0">
+                <a:solidFill>
+                  <a:srgbClr val="000000"/>
+                </a:solidFill>
+              </a:endParaRPr>
+            </a:p>
+          </p:txBody>
+        </p:sp>
+      </p:grpSp>
     </p:spTree>
     <p:extLst>
       <p:ext uri="{BB962C8B-B14F-4D97-AF65-F5344CB8AC3E}">

</xml_diff>

<commit_message>
total analysis doc added and scripts edited
</commit_message>
<xml_diff>
--- a/investigation/docs/tree_of_life.pptx
+++ b/investigation/docs/tree_of_life.pptx
@@ -288,7 +288,7 @@
           <a:p>
             <a:fld id="{BEE92577-E82C-8840-AAC8-D79475DE2FC3}" type="datetimeFigureOut">
               <a:rPr lang="en-US" smtClean="0"/>
-              <a:t>27/04/15</a:t>
+              <a:t>28/04/15</a:t>
             </a:fld>
             <a:endParaRPr lang="en-US"/>
           </a:p>
@@ -458,7 +458,7 @@
           <a:p>
             <a:fld id="{BEE92577-E82C-8840-AAC8-D79475DE2FC3}" type="datetimeFigureOut">
               <a:rPr lang="en-US" smtClean="0"/>
-              <a:t>27/04/15</a:t>
+              <a:t>28/04/15</a:t>
             </a:fld>
             <a:endParaRPr lang="en-US"/>
           </a:p>
@@ -638,7 +638,7 @@
           <a:p>
             <a:fld id="{BEE92577-E82C-8840-AAC8-D79475DE2FC3}" type="datetimeFigureOut">
               <a:rPr lang="en-US" smtClean="0"/>
-              <a:t>27/04/15</a:t>
+              <a:t>28/04/15</a:t>
             </a:fld>
             <a:endParaRPr lang="en-US"/>
           </a:p>
@@ -808,7 +808,7 @@
           <a:p>
             <a:fld id="{BEE92577-E82C-8840-AAC8-D79475DE2FC3}" type="datetimeFigureOut">
               <a:rPr lang="en-US" smtClean="0"/>
-              <a:t>27/04/15</a:t>
+              <a:t>28/04/15</a:t>
             </a:fld>
             <a:endParaRPr lang="en-US"/>
           </a:p>
@@ -1054,7 +1054,7 @@
           <a:p>
             <a:fld id="{BEE92577-E82C-8840-AAC8-D79475DE2FC3}" type="datetimeFigureOut">
               <a:rPr lang="en-US" smtClean="0"/>
-              <a:t>27/04/15</a:t>
+              <a:t>28/04/15</a:t>
             </a:fld>
             <a:endParaRPr lang="en-US"/>
           </a:p>
@@ -1342,7 +1342,7 @@
           <a:p>
             <a:fld id="{BEE92577-E82C-8840-AAC8-D79475DE2FC3}" type="datetimeFigureOut">
               <a:rPr lang="en-US" smtClean="0"/>
-              <a:t>27/04/15</a:t>
+              <a:t>28/04/15</a:t>
             </a:fld>
             <a:endParaRPr lang="en-US"/>
           </a:p>
@@ -1764,7 +1764,7 @@
           <a:p>
             <a:fld id="{BEE92577-E82C-8840-AAC8-D79475DE2FC3}" type="datetimeFigureOut">
               <a:rPr lang="en-US" smtClean="0"/>
-              <a:t>27/04/15</a:t>
+              <a:t>28/04/15</a:t>
             </a:fld>
             <a:endParaRPr lang="en-US"/>
           </a:p>
@@ -1882,7 +1882,7 @@
           <a:p>
             <a:fld id="{BEE92577-E82C-8840-AAC8-D79475DE2FC3}" type="datetimeFigureOut">
               <a:rPr lang="en-US" smtClean="0"/>
-              <a:t>27/04/15</a:t>
+              <a:t>28/04/15</a:t>
             </a:fld>
             <a:endParaRPr lang="en-US"/>
           </a:p>
@@ -1977,7 +1977,7 @@
           <a:p>
             <a:fld id="{BEE92577-E82C-8840-AAC8-D79475DE2FC3}" type="datetimeFigureOut">
               <a:rPr lang="en-US" smtClean="0"/>
-              <a:t>27/04/15</a:t>
+              <a:t>28/04/15</a:t>
             </a:fld>
             <a:endParaRPr lang="en-US"/>
           </a:p>
@@ -2254,7 +2254,7 @@
           <a:p>
             <a:fld id="{BEE92577-E82C-8840-AAC8-D79475DE2FC3}" type="datetimeFigureOut">
               <a:rPr lang="en-US" smtClean="0"/>
-              <a:t>27/04/15</a:t>
+              <a:t>28/04/15</a:t>
             </a:fld>
             <a:endParaRPr lang="en-US"/>
           </a:p>
@@ -2507,7 +2507,7 @@
           <a:p>
             <a:fld id="{BEE92577-E82C-8840-AAC8-D79475DE2FC3}" type="datetimeFigureOut">
               <a:rPr lang="en-US" smtClean="0"/>
-              <a:t>27/04/15</a:t>
+              <a:t>28/04/15</a:t>
             </a:fld>
             <a:endParaRPr lang="en-US"/>
           </a:p>
@@ -2720,7 +2720,7 @@
           <a:p>
             <a:fld id="{BEE92577-E82C-8840-AAC8-D79475DE2FC3}" type="datetimeFigureOut">
               <a:rPr lang="en-US" smtClean="0"/>
-              <a:t>27/04/15</a:t>
+              <a:t>28/04/15</a:t>
             </a:fld>
             <a:endParaRPr lang="en-US"/>
           </a:p>
@@ -3911,7 +3911,7 @@
                     <a:srgbClr val="000000"/>
                   </a:solidFill>
                 </a:rPr>
-                <a:t>237</a:t>
+                <a:t>229</a:t>
               </a:r>
               <a:endParaRPr lang="en-US" dirty="0">
                 <a:solidFill>
@@ -4079,7 +4079,7 @@
                     <a:srgbClr val="000000"/>
                   </a:solidFill>
                 </a:rPr>
-                <a:t>47</a:t>
+                <a:t>35</a:t>
               </a:r>
               <a:endParaRPr lang="en-US" dirty="0">
                 <a:solidFill>
@@ -4415,7 +4415,7 @@
                     <a:srgbClr val="000000"/>
                   </a:solidFill>
                 </a:rPr>
-                <a:t>53</a:t>
+                <a:t>44</a:t>
               </a:r>
               <a:endParaRPr lang="en-US" dirty="0">
                 <a:solidFill>
@@ -4583,7 +4583,7 @@
                     <a:srgbClr val="000000"/>
                   </a:solidFill>
                 </a:rPr>
-                <a:t>87</a:t>
+                <a:t>84</a:t>
               </a:r>
               <a:endParaRPr lang="en-US" dirty="0">
                 <a:solidFill>
@@ -4751,7 +4751,7 @@
                     <a:srgbClr val="000000"/>
                   </a:solidFill>
                 </a:rPr>
-                <a:t>46</a:t>
+                <a:t>40</a:t>
               </a:r>
               <a:endParaRPr lang="en-US" dirty="0">
                 <a:solidFill>

</xml_diff>